<commit_message>
Adding chapters 7 to 10
</commit_message>
<xml_diff>
--- a/02 Midterm/ITP64 Chapter 7.pptx
+++ b/02 Midterm/ITP64 Chapter 7.pptx
@@ -30,7 +30,6 @@
     <p:sldId id="278" r:id="rId44"/>
     <p:sldId id="279" r:id="rId45"/>
     <p:sldId id="280" r:id="rId46"/>
-    <p:sldId id="281" r:id="rId47"/>
   </p:sldIdLst>
   <p:sldSz cx="18288000" cy="10287000"/>
   <p:notesSz cx="6858000" cy="9144000"/>
@@ -3570,6 +3569,44 @@
         </p:nvSpPr>
         <p:spPr>
           <a:xfrm rot="0">
+            <a:off x="1028700" y="5901499"/>
+            <a:ext cx="7157940" cy="1776731"/>
+          </a:xfrm>
+          <a:prstGeom prst="rect">
+            <a:avLst/>
+          </a:prstGeom>
+        </p:spPr>
+        <p:txBody>
+          <a:bodyPr anchor="t" rtlCol="false" tIns="0" lIns="0" bIns="0" rIns="0">
+            <a:spAutoFit/>
+          </a:bodyPr>
+          <a:lstStyle/>
+          <a:p>
+            <a:pPr>
+              <a:lnSpc>
+                <a:spcPts val="14419"/>
+              </a:lnSpc>
+            </a:pPr>
+            <a:r>
+              <a:rPr lang="en-US" sz="10299">
+                <a:solidFill>
+                  <a:srgbClr val="D9EAF3"/>
+                </a:solidFill>
+                <a:latin typeface="Roboto Condensed Bold"/>
+              </a:rPr>
+              <a:t>Security </a:t>
+            </a:r>
+          </a:p>
+        </p:txBody>
+      </p:sp>
+      <p:sp>
+        <p:nvSpPr>
+          <p:cNvPr name="TextBox 13" id="13"/>
+          <p:cNvSpPr txBox="true"/>
+          <p:nvPr/>
+        </p:nvSpPr>
+        <p:spPr>
+          <a:xfrm rot="0">
             <a:off x="1028700" y="7293329"/>
             <a:ext cx="9448570" cy="1776731"/>
           </a:xfrm>
@@ -3595,7 +3632,7 @@
                 </a:solidFill>
                 <a:latin typeface="Roboto Condensed Bold"/>
               </a:rPr>
-              <a:t>Vulnerabilities</a:t>
+              <a:t>Assessments</a:t>
             </a:r>
           </a:p>
         </p:txBody>
@@ -3941,7 +3978,7 @@
         </p:nvSpPr>
         <p:spPr>
           <a:xfrm rot="0">
-            <a:off x="10780405" y="1527309"/>
+            <a:off x="13186381" y="1527309"/>
             <a:ext cx="4947920" cy="1104265"/>
           </a:xfrm>
           <a:prstGeom prst="rect">
@@ -3966,7 +4003,7 @@
                 </a:solidFill>
                 <a:latin typeface="Roboto Condensed Bold"/>
               </a:rPr>
-              <a:t>Party Risks</a:t>
+              <a:t>Scans</a:t>
             </a:r>
           </a:p>
         </p:txBody>
@@ -3980,7 +4017,7 @@
         <p:spPr>
           <a:xfrm rot="0">
             <a:off x="8795563" y="1527309"/>
-            <a:ext cx="2277365" cy="1104265"/>
+            <a:ext cx="5072582" cy="1104265"/>
           </a:xfrm>
           <a:prstGeom prst="rect">
             <a:avLst/>
@@ -4004,7 +4041,7 @@
                 </a:solidFill>
                 <a:latin typeface="Roboto Condensed Bold"/>
               </a:rPr>
-              <a:t>Third</a:t>
+              <a:t>Vulnerability </a:t>
             </a:r>
           </a:p>
         </p:txBody>
@@ -4017,8 +4054,8 @@
         </p:nvSpPr>
         <p:spPr>
           <a:xfrm rot="0">
-            <a:off x="8795563" y="2801138"/>
-            <a:ext cx="8099085" cy="679450"/>
+            <a:off x="8795563" y="3841440"/>
+            <a:ext cx="9205875" cy="4267200"/>
           </a:xfrm>
           <a:prstGeom prst="rect">
             <a:avLst/>
@@ -4032,47 +4069,18 @@
           <a:p>
             <a:pPr>
               <a:lnSpc>
-                <a:spcPts val="5599"/>
+                <a:spcPts val="4200"/>
               </a:lnSpc>
             </a:pPr>
             <a:r>
-              <a:rPr lang="en-US" sz="3999">
+              <a:rPr lang="en-US" sz="3000">
                 <a:solidFill>
-                  <a:srgbClr val="B6E4FD"/>
+                  <a:srgbClr val="FFFFFF"/>
                 </a:solidFill>
                 <a:latin typeface="Roboto Condensed"/>
               </a:rPr>
-              <a:t>System integration</a:t>
-            </a:r>
-          </a:p>
-        </p:txBody>
-      </p:sp>
-      <p:sp>
-        <p:nvSpPr>
-          <p:cNvPr name="TextBox 11" id="11"/>
-          <p:cNvSpPr txBox="true"/>
-          <p:nvPr/>
-        </p:nvSpPr>
-        <p:spPr>
-          <a:xfrm rot="0">
-            <a:off x="8795563" y="3841440"/>
-            <a:ext cx="9205875" cy="2667000"/>
-          </a:xfrm>
-          <a:prstGeom prst="rect">
-            <a:avLst/>
-          </a:prstGeom>
-        </p:spPr>
-        <p:txBody>
-          <a:bodyPr anchor="t" rtlCol="false" tIns="0" lIns="0" bIns="0" rIns="0">
-            <a:spAutoFit/>
-          </a:bodyPr>
-          <a:lstStyle/>
-          <a:p>
-            <a:pPr>
-              <a:lnSpc>
-                <a:spcPts val="4200"/>
-              </a:lnSpc>
-            </a:pPr>
+              <a:t>Vulnerability scans assess the strength of a deployed application against the desired performance of the system when being attacked. </a:t>
+            </a:r>
             <a:r>
               <a:rPr lang="en-US" sz="3000">
                 <a:solidFill>
@@ -4080,7 +4088,7 @@
                 </a:solidFill>
                 <a:latin typeface="Roboto Condensed Italics"/>
               </a:rPr>
-              <a:t>System integration</a:t>
+              <a:t>Application</a:t>
             </a:r>
             <a:r>
               <a:rPr lang="en-US" sz="3000">
@@ -4089,7 +4097,7 @@
                 </a:solidFill>
                 <a:latin typeface="Roboto Condensed"/>
               </a:rPr>
-              <a:t> is an area where vulnerabilities can exist, as the pieces can have gaps in their integration or capabilities that do not manifest per the desired specification.</a:t>
+              <a:t> vulnerabilities represent some of the riskier problems in the enterprise because the applications are necessary, and there are fewer methods to handle miscommunications of data the higher up the stack one goes. </a:t>
             </a:r>
           </a:p>
           <a:p>
@@ -4442,7 +4450,7 @@
         </p:nvSpPr>
         <p:spPr>
           <a:xfrm rot="0">
-            <a:off x="10780405" y="1527309"/>
+            <a:off x="13186381" y="1527309"/>
             <a:ext cx="4947920" cy="1104265"/>
           </a:xfrm>
           <a:prstGeom prst="rect">
@@ -4467,7 +4475,7 @@
                 </a:solidFill>
                 <a:latin typeface="Roboto Condensed Bold"/>
               </a:rPr>
-              <a:t>Party Risks</a:t>
+              <a:t>Scans</a:t>
             </a:r>
           </a:p>
         </p:txBody>
@@ -4481,7 +4489,7 @@
         <p:spPr>
           <a:xfrm rot="0">
             <a:off x="8795563" y="1527309"/>
-            <a:ext cx="2277365" cy="1104265"/>
+            <a:ext cx="5072582" cy="1104265"/>
           </a:xfrm>
           <a:prstGeom prst="rect">
             <a:avLst/>
@@ -4505,7 +4513,7 @@
                 </a:solidFill>
                 <a:latin typeface="Roboto Condensed Bold"/>
               </a:rPr>
-              <a:t>Third</a:t>
+              <a:t>Vulnerability </a:t>
             </a:r>
           </a:p>
         </p:txBody>
@@ -4518,8 +4526,8 @@
         </p:nvSpPr>
         <p:spPr>
           <a:xfrm rot="0">
-            <a:off x="8795563" y="2801138"/>
-            <a:ext cx="8099085" cy="679450"/>
+            <a:off x="8795563" y="3841440"/>
+            <a:ext cx="9205875" cy="3200400"/>
           </a:xfrm>
           <a:prstGeom prst="rect">
             <a:avLst/>
@@ -4533,47 +4541,18 @@
           <a:p>
             <a:pPr>
               <a:lnSpc>
-                <a:spcPts val="5599"/>
+                <a:spcPts val="4200"/>
               </a:lnSpc>
             </a:pPr>
             <a:r>
-              <a:rPr lang="en-US" sz="3999">
+              <a:rPr lang="en-US" sz="3000">
                 <a:solidFill>
-                  <a:srgbClr val="B6E4FD"/>
+                  <a:srgbClr val="FFFFFF"/>
                 </a:solidFill>
                 <a:latin typeface="Roboto Condensed"/>
               </a:rPr>
-              <a:t>Lack of vendor support</a:t>
-            </a:r>
-          </a:p>
-        </p:txBody>
-      </p:sp>
-      <p:sp>
-        <p:nvSpPr>
-          <p:cNvPr name="TextBox 11" id="11"/>
-          <p:cNvSpPr txBox="true"/>
-          <p:nvPr/>
-        </p:nvSpPr>
-        <p:spPr>
-          <a:xfrm rot="0">
-            <a:off x="8795563" y="3841440"/>
-            <a:ext cx="9205875" cy="4267200"/>
-          </a:xfrm>
-          <a:prstGeom prst="rect">
-            <a:avLst/>
-          </a:prstGeom>
-        </p:spPr>
-        <p:txBody>
-          <a:bodyPr anchor="t" rtlCol="false" tIns="0" lIns="0" bIns="0" rIns="0">
-            <a:spAutoFit/>
-          </a:bodyPr>
-          <a:lstStyle/>
-          <a:p>
-            <a:pPr>
-              <a:lnSpc>
-                <a:spcPts val="4200"/>
-              </a:lnSpc>
-            </a:pPr>
+              <a:t>From a vulnerability scan perspective, a </a:t>
+            </a:r>
             <a:r>
               <a:rPr lang="en-US" sz="3000">
                 <a:solidFill>
@@ -4581,7 +4560,7 @@
                 </a:solidFill>
                 <a:latin typeface="Roboto Condensed Italics"/>
               </a:rPr>
-              <a:t>Lack of vendor support </a:t>
+              <a:t>web</a:t>
             </a:r>
             <a:r>
               <a:rPr lang="en-US" sz="3000">
@@ -4590,7 +4569,7 @@
                 </a:solidFill>
                 <a:latin typeface="Roboto Condensed"/>
               </a:rPr>
-              <a:t>can become an issue at several different levels. The most obvious scenario is when the original manufacturer of the item, be it hardware or software, no longer offers support. When an item reaches its end of life (EOL) from the original manufacturer’s standpoint, this signifies the finality of its life under almost all circumstances.</a:t>
+              <a:t> is like an invitation to explore how well it is secured. At greatest risk are homegrown web applications because they seldom have the level of input protections needed for a hostile web environment.</a:t>
             </a:r>
           </a:p>
           <a:p>
@@ -4943,7 +4922,7 @@
         </p:nvSpPr>
         <p:spPr>
           <a:xfrm rot="0">
-            <a:off x="10780405" y="1527309"/>
+            <a:off x="13186381" y="1527309"/>
             <a:ext cx="4947920" cy="1104265"/>
           </a:xfrm>
           <a:prstGeom prst="rect">
@@ -4968,7 +4947,7 @@
                 </a:solidFill>
                 <a:latin typeface="Roboto Condensed Bold"/>
               </a:rPr>
-              <a:t>Party Risks</a:t>
+              <a:t>Scans</a:t>
             </a:r>
           </a:p>
         </p:txBody>
@@ -4982,7 +4961,7 @@
         <p:spPr>
           <a:xfrm rot="0">
             <a:off x="8795563" y="1527309"/>
-            <a:ext cx="2277365" cy="1104265"/>
+            <a:ext cx="5072582" cy="1104265"/>
           </a:xfrm>
           <a:prstGeom prst="rect">
             <a:avLst/>
@@ -5006,7 +4985,7 @@
                 </a:solidFill>
                 <a:latin typeface="Roboto Condensed Bold"/>
               </a:rPr>
-              <a:t>Third</a:t>
+              <a:t>Vulnerability </a:t>
             </a:r>
           </a:p>
         </p:txBody>
@@ -5019,8 +4998,8 @@
         </p:nvSpPr>
         <p:spPr>
           <a:xfrm rot="0">
-            <a:off x="8795563" y="2801138"/>
-            <a:ext cx="8099085" cy="679450"/>
+            <a:off x="8795563" y="3841440"/>
+            <a:ext cx="9205875" cy="3200400"/>
           </a:xfrm>
           <a:prstGeom prst="rect">
             <a:avLst/>
@@ -5034,47 +5013,18 @@
           <a:p>
             <a:pPr>
               <a:lnSpc>
-                <a:spcPts val="5599"/>
+                <a:spcPts val="4200"/>
               </a:lnSpc>
             </a:pPr>
             <a:r>
-              <a:rPr lang="en-US" sz="3999">
+              <a:rPr lang="en-US" sz="3000">
                 <a:solidFill>
-                  <a:srgbClr val="B6E4FD"/>
+                  <a:srgbClr val="FFFFFF"/>
                 </a:solidFill>
                 <a:latin typeface="Roboto Condensed"/>
               </a:rPr>
-              <a:t>Supply chain</a:t>
-            </a:r>
-          </a:p>
-        </p:txBody>
-      </p:sp>
-      <p:sp>
-        <p:nvSpPr>
-          <p:cNvPr name="TextBox 11" id="11"/>
-          <p:cNvSpPr txBox="true"/>
-          <p:nvPr/>
-        </p:nvSpPr>
-        <p:spPr>
-          <a:xfrm rot="0">
-            <a:off x="8795563" y="3841440"/>
-            <a:ext cx="9205875" cy="2667000"/>
-          </a:xfrm>
-          <a:prstGeom prst="rect">
-            <a:avLst/>
-          </a:prstGeom>
-        </p:spPr>
-        <p:txBody>
-          <a:bodyPr anchor="t" rtlCol="false" tIns="0" lIns="0" bIns="0" rIns="0">
-            <a:spAutoFit/>
-          </a:bodyPr>
-          <a:lstStyle/>
-          <a:p>
-            <a:pPr>
-              <a:lnSpc>
-                <a:spcPts val="4200"/>
-              </a:lnSpc>
-            </a:pPr>
+              <a:t>The </a:t>
+            </a:r>
             <a:r>
               <a:rPr lang="en-US" sz="3000">
                 <a:solidFill>
@@ -5082,7 +5032,7 @@
                 </a:solidFill>
                 <a:latin typeface="Roboto Condensed Italics"/>
               </a:rPr>
-              <a:t>Supply chain </a:t>
+              <a:t>network</a:t>
             </a:r>
             <a:r>
               <a:rPr lang="en-US" sz="3000">
@@ -5091,7 +5041,7 @@
                 </a:solidFill>
                 <a:latin typeface="Roboto Condensed"/>
               </a:rPr>
-              <a:t>risk is caused by vulnerabilities that lie within the supply chain. Whether these vulnerabilities are in the actual supply chain itself or a product coming from a third party, the results are the same—a level of increased risk.</a:t>
+              <a:t> can also be used in vulnerability scanning to access connected systems. The most common vulnerability scans are performed across the network in a sweep where all systems are scanned, mapped, and enumerated per the ports and services.</a:t>
             </a:r>
           </a:p>
           <a:p>
@@ -5444,7 +5394,7 @@
         </p:nvSpPr>
         <p:spPr>
           <a:xfrm rot="0">
-            <a:off x="10780405" y="1527309"/>
+            <a:off x="13186381" y="1527309"/>
             <a:ext cx="4947920" cy="1104265"/>
           </a:xfrm>
           <a:prstGeom prst="rect">
@@ -5469,7 +5419,7 @@
                 </a:solidFill>
                 <a:latin typeface="Roboto Condensed Bold"/>
               </a:rPr>
-              <a:t>Party Risks</a:t>
+              <a:t>Scans</a:t>
             </a:r>
           </a:p>
         </p:txBody>
@@ -5483,7 +5433,7 @@
         <p:spPr>
           <a:xfrm rot="0">
             <a:off x="8795563" y="1527309"/>
-            <a:ext cx="2277365" cy="1104265"/>
+            <a:ext cx="5072582" cy="1104265"/>
           </a:xfrm>
           <a:prstGeom prst="rect">
             <a:avLst/>
@@ -5507,7 +5457,7 @@
                 </a:solidFill>
                 <a:latin typeface="Roboto Condensed Bold"/>
               </a:rPr>
-              <a:t>Third</a:t>
+              <a:t>Vulnerability </a:t>
             </a:r>
           </a:p>
         </p:txBody>
@@ -5520,8 +5470,8 @@
         </p:nvSpPr>
         <p:spPr>
           <a:xfrm rot="0">
-            <a:off x="8795563" y="2801138"/>
-            <a:ext cx="8099085" cy="679450"/>
+            <a:off x="8795563" y="3841440"/>
+            <a:ext cx="9205875" cy="4267200"/>
           </a:xfrm>
           <a:prstGeom prst="rect">
             <a:avLst/>
@@ -5535,47 +5485,18 @@
           <a:p>
             <a:pPr>
               <a:lnSpc>
-                <a:spcPts val="5599"/>
+                <a:spcPts val="4200"/>
               </a:lnSpc>
             </a:pPr>
             <a:r>
-              <a:rPr lang="en-US" sz="3999">
+              <a:rPr lang="en-US" sz="3000">
                 <a:solidFill>
-                  <a:srgbClr val="B6E4FD"/>
+                  <a:srgbClr val="FFFFFF"/>
                 </a:solidFill>
                 <a:latin typeface="Roboto Condensed"/>
               </a:rPr>
-              <a:t>Outsourced code</a:t>
-            </a:r>
-          </a:p>
-        </p:txBody>
-      </p:sp>
-      <p:sp>
-        <p:nvSpPr>
-          <p:cNvPr name="TextBox 11" id="11"/>
-          <p:cNvSpPr txBox="true"/>
-          <p:nvPr/>
-        </p:nvSpPr>
-        <p:spPr>
-          <a:xfrm rot="0">
-            <a:off x="8795563" y="3841440"/>
-            <a:ext cx="9205875" cy="3200400"/>
-          </a:xfrm>
-          <a:prstGeom prst="rect">
-            <a:avLst/>
-          </a:prstGeom>
-        </p:spPr>
-        <p:txBody>
-          <a:bodyPr anchor="t" rtlCol="false" tIns="0" lIns="0" bIns="0" rIns="0">
-            <a:spAutoFit/>
-          </a:bodyPr>
-          <a:lstStyle/>
-          <a:p>
-            <a:pPr>
-              <a:lnSpc>
-                <a:spcPts val="4200"/>
-              </a:lnSpc>
-            </a:pPr>
+              <a:t>The </a:t>
+            </a:r>
             <a:r>
               <a:rPr lang="en-US" sz="3000">
                 <a:solidFill>
@@ -5583,7 +5504,7 @@
                 </a:solidFill>
                 <a:latin typeface="Roboto Condensed Italics"/>
               </a:rPr>
-              <a:t>Outsourced code </a:t>
+              <a:t>Common Vulnerabilities and Exposures (CVE) </a:t>
             </a:r>
             <a:r>
               <a:rPr lang="en-US" sz="3000">
@@ -5592,7 +5513,7 @@
                 </a:solidFill>
                 <a:latin typeface="Roboto Condensed"/>
               </a:rPr>
-              <a:t>can be one of the greatest sources of vulnerabilities and risk in an enterprise. Code is embedded in so many aspects of the enterprise—from the equipment to the business processes, from the applications that make things run to the infrastructure it all runs on</a:t>
+              <a:t>enumeration is a list of known vulnerabilities in software systems. Each vulnerability in the list has an identification number, description, and reference. This list is the basis for most vulnerability scanner systems, as the scanners determine the software version and look up known or reported vulnerabilities. </a:t>
             </a:r>
           </a:p>
           <a:p>
@@ -5945,7 +5866,7 @@
         </p:nvSpPr>
         <p:spPr>
           <a:xfrm rot="0">
-            <a:off x="10780405" y="1527309"/>
+            <a:off x="13186381" y="1527309"/>
             <a:ext cx="4947920" cy="1104265"/>
           </a:xfrm>
           <a:prstGeom prst="rect">
@@ -5970,7 +5891,7 @@
                 </a:solidFill>
                 <a:latin typeface="Roboto Condensed Bold"/>
               </a:rPr>
-              <a:t>Party Risks</a:t>
+              <a:t>Scans</a:t>
             </a:r>
           </a:p>
         </p:txBody>
@@ -5984,7 +5905,7 @@
         <p:spPr>
           <a:xfrm rot="0">
             <a:off x="8795563" y="1527309"/>
-            <a:ext cx="2277365" cy="1104265"/>
+            <a:ext cx="5072582" cy="1104265"/>
           </a:xfrm>
           <a:prstGeom prst="rect">
             <a:avLst/>
@@ -6008,7 +5929,7 @@
                 </a:solidFill>
                 <a:latin typeface="Roboto Condensed Bold"/>
               </a:rPr>
-              <a:t>Third</a:t>
+              <a:t>Vulnerability </a:t>
             </a:r>
           </a:p>
         </p:txBody>
@@ -6021,8 +5942,8 @@
         </p:nvSpPr>
         <p:spPr>
           <a:xfrm rot="0">
-            <a:off x="8795563" y="2801138"/>
-            <a:ext cx="8099085" cy="679450"/>
+            <a:off x="8795563" y="3841440"/>
+            <a:ext cx="9205875" cy="2133600"/>
           </a:xfrm>
           <a:prstGeom prst="rect">
             <a:avLst/>
@@ -6036,47 +5957,18 @@
           <a:p>
             <a:pPr>
               <a:lnSpc>
-                <a:spcPts val="5599"/>
+                <a:spcPts val="4200"/>
               </a:lnSpc>
             </a:pPr>
             <a:r>
-              <a:rPr lang="en-US" sz="3999">
+              <a:rPr lang="en-US" sz="3000">
                 <a:solidFill>
-                  <a:srgbClr val="B6E4FD"/>
+                  <a:srgbClr val="FFFFFF"/>
                 </a:solidFill>
                 <a:latin typeface="Roboto Condensed"/>
               </a:rPr>
-              <a:t>Data storage </a:t>
-            </a:r>
-          </a:p>
-        </p:txBody>
-      </p:sp>
-      <p:sp>
-        <p:nvSpPr>
-          <p:cNvPr name="TextBox 11" id="11"/>
-          <p:cNvSpPr txBox="true"/>
-          <p:nvPr/>
-        </p:nvSpPr>
-        <p:spPr>
-          <a:xfrm rot="0">
-            <a:off x="8795563" y="3841440"/>
-            <a:ext cx="9205875" cy="3200400"/>
-          </a:xfrm>
-          <a:prstGeom prst="rect">
-            <a:avLst/>
-          </a:prstGeom>
-        </p:spPr>
-        <p:txBody>
-          <a:bodyPr anchor="t" rtlCol="false" tIns="0" lIns="0" bIns="0" rIns="0">
-            <a:spAutoFit/>
-          </a:bodyPr>
-          <a:lstStyle/>
-          <a:p>
-            <a:pPr>
-              <a:lnSpc>
-                <a:spcPts val="4200"/>
-              </a:lnSpc>
-            </a:pPr>
+              <a:t>The </a:t>
+            </a:r>
             <a:r>
               <a:rPr lang="en-US" sz="3000">
                 <a:solidFill>
@@ -6084,7 +5976,7 @@
                 </a:solidFill>
                 <a:latin typeface="Roboto Condensed Italics"/>
               </a:rPr>
-              <a:t>Data storage </a:t>
+              <a:t>Common Vulnerability Scoring System (CVSS) </a:t>
             </a:r>
             <a:r>
               <a:rPr lang="en-US" sz="3000">
@@ -6093,7 +5985,7 @@
                 </a:solidFill>
                 <a:latin typeface="Roboto Condensed"/>
               </a:rPr>
-              <a:t>is an important aspect of every enterprise, and it is typically distributed throughout the enterprise in different capacities and configurations. If all data was in a single location, then data storage management, including backup and recovery functions, would be easy to manage.</a:t>
+              <a:t>is a scoring system to determine how risky a vulnerability can be to a system. The CVSS score ranges from 0 to 10.</a:t>
             </a:r>
           </a:p>
           <a:p>
@@ -6446,8 +6338,8 @@
         </p:nvSpPr>
         <p:spPr>
           <a:xfrm rot="0">
-            <a:off x="10780405" y="1527309"/>
-            <a:ext cx="6840317" cy="1104265"/>
+            <a:off x="13186381" y="1527309"/>
+            <a:ext cx="4947920" cy="1104265"/>
           </a:xfrm>
           <a:prstGeom prst="rect">
             <a:avLst/>
@@ -6471,7 +6363,7 @@
                 </a:solidFill>
                 <a:latin typeface="Roboto Condensed Bold"/>
               </a:rPr>
-              <a:t>Patch management</a:t>
+              <a:t>Scans</a:t>
             </a:r>
           </a:p>
         </p:txBody>
@@ -6485,7 +6377,7 @@
         <p:spPr>
           <a:xfrm rot="0">
             <a:off x="8795563" y="1527309"/>
-            <a:ext cx="2277365" cy="1104265"/>
+            <a:ext cx="5072582" cy="1104265"/>
           </a:xfrm>
           <a:prstGeom prst="rect">
             <a:avLst/>
@@ -6509,7 +6401,7 @@
                 </a:solidFill>
                 <a:latin typeface="Roboto Condensed Bold"/>
               </a:rPr>
-              <a:t>Weak</a:t>
+              <a:t>Vulnerability </a:t>
             </a:r>
           </a:p>
         </p:txBody>
@@ -6523,7 +6415,7 @@
         <p:spPr>
           <a:xfrm rot="0">
             <a:off x="8795563" y="3841440"/>
-            <a:ext cx="9205875" cy="3200400"/>
+            <a:ext cx="9205875" cy="2667000"/>
           </a:xfrm>
           <a:prstGeom prst="rect">
             <a:avLst/>
@@ -6540,6 +6432,15 @@
                 <a:spcPts val="4200"/>
               </a:lnSpc>
             </a:pPr>
+            <a:r>
+              <a:rPr lang="en-US" sz="3000">
+                <a:solidFill>
+                  <a:srgbClr val="FFFFFF"/>
+                </a:solidFill>
+                <a:latin typeface="Roboto Condensed Italics"/>
+              </a:rPr>
+              <a:t>Configuration reviews </a:t>
+            </a:r>
             <a:r>
               <a:rPr lang="en-US" sz="3000">
                 <a:solidFill>
@@ -6547,25 +6448,7 @@
                 </a:solidFill>
                 <a:latin typeface="Roboto Condensed"/>
               </a:rPr>
-              <a:t>Having an </a:t>
-            </a:r>
-            <a:r>
-              <a:rPr lang="en-US" sz="3000">
-                <a:solidFill>
-                  <a:srgbClr val="FFFFFF"/>
-                </a:solidFill>
-                <a:latin typeface="Roboto Condensed Italics"/>
-              </a:rPr>
-              <a:t>improper or weak patch management </a:t>
-            </a:r>
-            <a:r>
-              <a:rPr lang="en-US" sz="3000">
-                <a:solidFill>
-                  <a:srgbClr val="FFFFFF"/>
-                </a:solidFill>
-                <a:latin typeface="Roboto Condensed"/>
-              </a:rPr>
-              <a:t>system is an open invitation to having vulnerabilities exploited. This makes patch management one of the essential security controls and one where there should be no excuses as to why it was not implemented. </a:t>
+              <a:t>are important enough that they should be automated and performed on a regular basis. There are protocols and standards for measuring and validating configurations.</a:t>
             </a:r>
           </a:p>
           <a:p>
@@ -6918,46 +6801,8 @@
         </p:nvSpPr>
         <p:spPr>
           <a:xfrm rot="0">
-            <a:off x="10780405" y="1527309"/>
-            <a:ext cx="6840317" cy="1104265"/>
-          </a:xfrm>
-          <a:prstGeom prst="rect">
-            <a:avLst/>
-          </a:prstGeom>
-        </p:spPr>
-        <p:txBody>
-          <a:bodyPr anchor="t" rtlCol="false" tIns="0" lIns="0" bIns="0" rIns="0">
-            <a:spAutoFit/>
-          </a:bodyPr>
-          <a:lstStyle/>
-          <a:p>
-            <a:pPr>
-              <a:lnSpc>
-                <a:spcPts val="8959"/>
-              </a:lnSpc>
-            </a:pPr>
-            <a:r>
-              <a:rPr lang="en-US" sz="6399">
-                <a:solidFill>
-                  <a:srgbClr val="509FCB"/>
-                </a:solidFill>
-                <a:latin typeface="Roboto Condensed Bold"/>
-              </a:rPr>
-              <a:t>Patch management</a:t>
-            </a:r>
-          </a:p>
-        </p:txBody>
-      </p:sp>
-      <p:sp>
-        <p:nvSpPr>
-          <p:cNvPr name="TextBox 9" id="9"/>
-          <p:cNvSpPr txBox="true"/>
-          <p:nvPr/>
-        </p:nvSpPr>
-        <p:spPr>
-          <a:xfrm rot="0">
             <a:off x="8795563" y="1527309"/>
-            <a:ext cx="2277365" cy="1104265"/>
+            <a:ext cx="5072582" cy="1104265"/>
           </a:xfrm>
           <a:prstGeom prst="rect">
             <a:avLst/>
@@ -6981,21 +6826,21 @@
                 </a:solidFill>
                 <a:latin typeface="Roboto Condensed Bold"/>
               </a:rPr>
-              <a:t>Weak</a:t>
+              <a:t>SYSLOG</a:t>
             </a:r>
           </a:p>
         </p:txBody>
       </p:sp>
       <p:sp>
         <p:nvSpPr>
-          <p:cNvPr name="TextBox 10" id="10"/>
+          <p:cNvPr name="TextBox 9" id="9"/>
           <p:cNvSpPr txBox="true"/>
           <p:nvPr/>
         </p:nvSpPr>
         <p:spPr>
           <a:xfrm rot="0">
             <a:off x="8795563" y="3841440"/>
-            <a:ext cx="9205875" cy="3200400"/>
+            <a:ext cx="9205875" cy="2133600"/>
           </a:xfrm>
           <a:prstGeom prst="rect">
             <a:avLst/>
@@ -7019,7 +6864,7 @@
                 </a:solidFill>
                 <a:latin typeface="Roboto Condensed Italics"/>
               </a:rPr>
-              <a:t>Firmware</a:t>
+              <a:t>Syslog</a:t>
             </a:r>
             <a:r>
               <a:rPr lang="en-US" sz="3000">
@@ -7028,7 +6873,7 @@
                 </a:solidFill>
                 <a:latin typeface="Roboto Condensed"/>
               </a:rPr>
-              <a:t> is just another form of software with one noted distinction: it is stored in hardware to be present when the system boots up. However, it is still software, with all the baggage of software—bugs, vulnerabilities, patch requirements, updates, and so on.</a:t>
+              <a:t> stands for System Logging Protocol and is a standard protocol used in Linux systems to send system log or event messages to a specific server, called a syslog server</a:t>
             </a:r>
           </a:p>
           <a:p>
@@ -7037,44 +6882,6 @@
                 <a:spcPts val="4200"/>
               </a:lnSpc>
             </a:pPr>
-          </a:p>
-        </p:txBody>
-      </p:sp>
-      <p:sp>
-        <p:nvSpPr>
-          <p:cNvPr name="TextBox 11" id="11"/>
-          <p:cNvSpPr txBox="true"/>
-          <p:nvPr/>
-        </p:nvSpPr>
-        <p:spPr>
-          <a:xfrm rot="0">
-            <a:off x="8795563" y="2801138"/>
-            <a:ext cx="8099085" cy="679450"/>
-          </a:xfrm>
-          <a:prstGeom prst="rect">
-            <a:avLst/>
-          </a:prstGeom>
-        </p:spPr>
-        <p:txBody>
-          <a:bodyPr anchor="t" rtlCol="false" tIns="0" lIns="0" bIns="0" rIns="0">
-            <a:spAutoFit/>
-          </a:bodyPr>
-          <a:lstStyle/>
-          <a:p>
-            <a:pPr>
-              <a:lnSpc>
-                <a:spcPts val="5599"/>
-              </a:lnSpc>
-            </a:pPr>
-            <a:r>
-              <a:rPr lang="en-US" sz="3999">
-                <a:solidFill>
-                  <a:srgbClr val="B6E4FD"/>
-                </a:solidFill>
-                <a:latin typeface="Roboto Condensed"/>
-              </a:rPr>
-              <a:t>firmware</a:t>
-            </a:r>
           </a:p>
         </p:txBody>
       </p:sp>
@@ -7419,46 +7226,8 @@
         </p:nvSpPr>
         <p:spPr>
           <a:xfrm rot="0">
-            <a:off x="10780405" y="1527309"/>
-            <a:ext cx="6840317" cy="1104265"/>
-          </a:xfrm>
-          <a:prstGeom prst="rect">
-            <a:avLst/>
-          </a:prstGeom>
-        </p:spPr>
-        <p:txBody>
-          <a:bodyPr anchor="t" rtlCol="false" tIns="0" lIns="0" bIns="0" rIns="0">
-            <a:spAutoFit/>
-          </a:bodyPr>
-          <a:lstStyle/>
-          <a:p>
-            <a:pPr>
-              <a:lnSpc>
-                <a:spcPts val="8959"/>
-              </a:lnSpc>
-            </a:pPr>
-            <a:r>
-              <a:rPr lang="en-US" sz="6399">
-                <a:solidFill>
-                  <a:srgbClr val="509FCB"/>
-                </a:solidFill>
-                <a:latin typeface="Roboto Condensed Bold"/>
-              </a:rPr>
-              <a:t>Patch management</a:t>
-            </a:r>
-          </a:p>
-        </p:txBody>
-      </p:sp>
-      <p:sp>
-        <p:nvSpPr>
-          <p:cNvPr name="TextBox 9" id="9"/>
-          <p:cNvSpPr txBox="true"/>
-          <p:nvPr/>
-        </p:nvSpPr>
-        <p:spPr>
-          <a:xfrm rot="0">
             <a:off x="8795563" y="1527309"/>
-            <a:ext cx="2277365" cy="1104265"/>
+            <a:ext cx="5072582" cy="1104265"/>
           </a:xfrm>
           <a:prstGeom prst="rect">
             <a:avLst/>
@@ -7482,14 +7251,14 @@
                 </a:solidFill>
                 <a:latin typeface="Roboto Condensed Bold"/>
               </a:rPr>
-              <a:t>Weak</a:t>
+              <a:t>SIEM</a:t>
             </a:r>
           </a:p>
         </p:txBody>
       </p:sp>
       <p:sp>
         <p:nvSpPr>
-          <p:cNvPr name="TextBox 10" id="10"/>
+          <p:cNvPr name="TextBox 9" id="9"/>
           <p:cNvSpPr txBox="true"/>
           <p:nvPr/>
         </p:nvSpPr>
@@ -7513,6 +7282,15 @@
                 <a:spcPts val="4200"/>
               </a:lnSpc>
             </a:pPr>
+            <a:r>
+              <a:rPr lang="en-US" sz="3000">
+                <a:solidFill>
+                  <a:srgbClr val="FFFFFF"/>
+                </a:solidFill>
+                <a:latin typeface="Roboto Condensed"/>
+              </a:rPr>
+              <a:t>The information in a syslog server is just tables of raw data. To make this information easier to use, a system called </a:t>
+            </a:r>
             <a:r>
               <a:rPr lang="en-US" sz="3000">
                 <a:solidFill>
@@ -7520,7 +7298,7 @@
                 </a:solidFill>
                 <a:latin typeface="Roboto Condensed Italics"/>
               </a:rPr>
-              <a:t>Applications</a:t>
+              <a:t>security information and event management (SIEM) </a:t>
             </a:r>
             <a:r>
               <a:rPr lang="en-US" sz="3000">
@@ -7529,7 +7307,7 @@
                 </a:solidFill>
                 <a:latin typeface="Roboto Condensed"/>
               </a:rPr>
-              <a:t> are the programs that comprise the functional aspect of the enterprise. From server-based elements such as web servers and database servers, to desktop applications like Microsoft Office, applications are the tools that handle the data and add value to the system. </a:t>
+              <a:t>is employed to collect, aggregate, and apply pattern matching to the volumes of data</a:t>
             </a:r>
           </a:p>
           <a:p>
@@ -7538,44 +7316,6 @@
                 <a:spcPts val="4200"/>
               </a:lnSpc>
             </a:pPr>
-          </a:p>
-        </p:txBody>
-      </p:sp>
-      <p:sp>
-        <p:nvSpPr>
-          <p:cNvPr name="TextBox 11" id="11"/>
-          <p:cNvSpPr txBox="true"/>
-          <p:nvPr/>
-        </p:nvSpPr>
-        <p:spPr>
-          <a:xfrm rot="0">
-            <a:off x="8795563" y="2801138"/>
-            <a:ext cx="8099085" cy="679450"/>
-          </a:xfrm>
-          <a:prstGeom prst="rect">
-            <a:avLst/>
-          </a:prstGeom>
-        </p:spPr>
-        <p:txBody>
-          <a:bodyPr anchor="t" rtlCol="false" tIns="0" lIns="0" bIns="0" rIns="0">
-            <a:spAutoFit/>
-          </a:bodyPr>
-          <a:lstStyle/>
-          <a:p>
-            <a:pPr>
-              <a:lnSpc>
-                <a:spcPts val="5599"/>
-              </a:lnSpc>
-            </a:pPr>
-            <a:r>
-              <a:rPr lang="en-US" sz="3999">
-                <a:solidFill>
-                  <a:srgbClr val="B6E4FD"/>
-                </a:solidFill>
-                <a:latin typeface="Roboto Condensed"/>
-              </a:rPr>
-              <a:t>Applications</a:t>
-            </a:r>
           </a:p>
         </p:txBody>
       </p:sp>
@@ -7920,46 +7660,8 @@
         </p:nvSpPr>
         <p:spPr>
           <a:xfrm rot="0">
-            <a:off x="11316584" y="1527309"/>
-            <a:ext cx="6304138" cy="1104265"/>
-          </a:xfrm>
-          <a:prstGeom prst="rect">
-            <a:avLst/>
-          </a:prstGeom>
-        </p:spPr>
-        <p:txBody>
-          <a:bodyPr anchor="t" rtlCol="false" tIns="0" lIns="0" bIns="0" rIns="0">
-            <a:spAutoFit/>
-          </a:bodyPr>
-          <a:lstStyle/>
-          <a:p>
-            <a:pPr>
-              <a:lnSpc>
-                <a:spcPts val="8959"/>
-              </a:lnSpc>
-            </a:pPr>
-            <a:r>
-              <a:rPr lang="en-US" sz="6399">
-                <a:solidFill>
-                  <a:srgbClr val="509FCB"/>
-                </a:solidFill>
-                <a:latin typeface="Roboto Condensed Bold"/>
-              </a:rPr>
-              <a:t>Platforms</a:t>
-            </a:r>
-          </a:p>
-        </p:txBody>
-      </p:sp>
-      <p:sp>
-        <p:nvSpPr>
-          <p:cNvPr name="TextBox 9" id="9"/>
-          <p:cNvSpPr txBox="true"/>
-          <p:nvPr/>
-        </p:nvSpPr>
-        <p:spPr>
-          <a:xfrm rot="0">
             <a:off x="8795563" y="1527309"/>
-            <a:ext cx="3081634" cy="1104265"/>
+            <a:ext cx="5072582" cy="1104265"/>
           </a:xfrm>
           <a:prstGeom prst="rect">
             <a:avLst/>
@@ -7983,21 +7685,21 @@
                 </a:solidFill>
                 <a:latin typeface="Roboto Condensed Bold"/>
               </a:rPr>
-              <a:t>Legacy</a:t>
+              <a:t>SIEM</a:t>
             </a:r>
           </a:p>
         </p:txBody>
       </p:sp>
       <p:sp>
         <p:nvSpPr>
-          <p:cNvPr name="TextBox 10" id="10"/>
+          <p:cNvPr name="TextBox 9" id="9"/>
           <p:cNvSpPr txBox="true"/>
           <p:nvPr/>
         </p:nvSpPr>
         <p:spPr>
           <a:xfrm rot="0">
             <a:off x="8795563" y="3841440"/>
-            <a:ext cx="9205875" cy="4267200"/>
+            <a:ext cx="9205875" cy="2667000"/>
           </a:xfrm>
           <a:prstGeom prst="rect">
             <a:avLst/>
@@ -8021,7 +7723,7 @@
                 </a:solidFill>
                 <a:latin typeface="Roboto Condensed Italics"/>
               </a:rPr>
-              <a:t>Legacy platforms </a:t>
+              <a:t>Packet captures </a:t>
             </a:r>
             <a:r>
               <a:rPr lang="en-US" sz="3000">
@@ -8030,7 +7732,7 @@
                 </a:solidFill>
                 <a:latin typeface="Roboto Condensed"/>
               </a:rPr>
-              <a:t>is the term used to describe systems that are no longer being marketed or supported. They are also considered old, which in IT terms can be as little as a few years. Legacy systems represent an interesting vulnerability because, by being in the legacy category, they are no longer supported, so if new problems are discovered, the only fix is a compensating control.</a:t>
+              <a:t>have been a staple of network engineers for as long as networks have existed. Diagnosing and understanding network communication problems is easier when one can observe how packets flow through a network.</a:t>
             </a:r>
           </a:p>
           <a:p>
@@ -8039,44 +7741,6 @@
                 <a:spcPts val="4200"/>
               </a:lnSpc>
             </a:pPr>
-          </a:p>
-        </p:txBody>
-      </p:sp>
-      <p:sp>
-        <p:nvSpPr>
-          <p:cNvPr name="TextBox 11" id="11"/>
-          <p:cNvSpPr txBox="true"/>
-          <p:nvPr/>
-        </p:nvSpPr>
-        <p:spPr>
-          <a:xfrm rot="0">
-            <a:off x="8795563" y="2801138"/>
-            <a:ext cx="8099085" cy="679450"/>
-          </a:xfrm>
-          <a:prstGeom prst="rect">
-            <a:avLst/>
-          </a:prstGeom>
-        </p:spPr>
-        <p:txBody>
-          <a:bodyPr anchor="t" rtlCol="false" tIns="0" lIns="0" bIns="0" rIns="0">
-            <a:spAutoFit/>
-          </a:bodyPr>
-          <a:lstStyle/>
-          <a:p>
-            <a:pPr>
-              <a:lnSpc>
-                <a:spcPts val="5599"/>
-              </a:lnSpc>
-            </a:pPr>
-            <a:r>
-              <a:rPr lang="en-US" sz="3999">
-                <a:solidFill>
-                  <a:srgbClr val="B6E4FD"/>
-                </a:solidFill>
-                <a:latin typeface="Roboto Condensed"/>
-              </a:rPr>
-              <a:t>legacy platforms</a:t>
-            </a:r>
           </a:p>
         </p:txBody>
       </p:sp>
@@ -8422,7 +8086,7 @@
         <p:spPr>
           <a:xfrm rot="0">
             <a:off x="8795563" y="1527309"/>
-            <a:ext cx="3081634" cy="1104265"/>
+            <a:ext cx="5072582" cy="1104265"/>
           </a:xfrm>
           <a:prstGeom prst="rect">
             <a:avLst/>
@@ -8446,7 +8110,7 @@
                 </a:solidFill>
                 <a:latin typeface="Roboto Condensed Bold"/>
               </a:rPr>
-              <a:t>Impacts</a:t>
+              <a:t>SIEM</a:t>
             </a:r>
           </a:p>
         </p:txBody>
@@ -8460,7 +8124,7 @@
         <p:spPr>
           <a:xfrm rot="0">
             <a:off x="8795563" y="3841440"/>
-            <a:ext cx="9205875" cy="2133600"/>
+            <a:ext cx="9205875" cy="3200400"/>
           </a:xfrm>
           <a:prstGeom prst="rect">
             <a:avLst/>
@@ -8477,6 +8141,15 @@
                 <a:spcPts val="4200"/>
               </a:lnSpc>
             </a:pPr>
+            <a:r>
+              <a:rPr lang="en-US" sz="3000">
+                <a:solidFill>
+                  <a:srgbClr val="FFFFFF"/>
+                </a:solidFill>
+                <a:latin typeface="Roboto Condensed"/>
+              </a:rPr>
+              <a:t>The </a:t>
+            </a:r>
             <a:r>
               <a:rPr lang="en-US" sz="3000">
                 <a:solidFill>
@@ -8484,7 +8157,7 @@
                 </a:solidFill>
                 <a:latin typeface="Roboto Condensed Italics"/>
               </a:rPr>
-              <a:t>Impacts</a:t>
+              <a:t>data inputs </a:t>
             </a:r>
             <a:r>
               <a:rPr lang="en-US" sz="3000">
@@ -8493,7 +8166,7 @@
                 </a:solidFill>
                 <a:latin typeface="Roboto Condensed"/>
               </a:rPr>
-              <a:t> are the resulting effects of a risk that is realized. Impacts are the items that an organization is attempting to avoid with a security incident. </a:t>
+              <a:t>to a SIEM are as varied as the systems they are used to protect. While a modern network can generate extremely large quantities of log data, what is important in a SIEM is to determine what information is needed to support what decisions.</a:t>
             </a:r>
           </a:p>
           <a:p>
@@ -8846,8 +8519,46 @@
         </p:nvSpPr>
         <p:spPr>
           <a:xfrm rot="0">
+            <a:off x="11171225" y="1527309"/>
+            <a:ext cx="4947920" cy="1104265"/>
+          </a:xfrm>
+          <a:prstGeom prst="rect">
+            <a:avLst/>
+          </a:prstGeom>
+        </p:spPr>
+        <p:txBody>
+          <a:bodyPr anchor="t" rtlCol="false" tIns="0" lIns="0" bIns="0" rIns="0">
+            <a:spAutoFit/>
+          </a:bodyPr>
+          <a:lstStyle/>
+          <a:p>
+            <a:pPr>
+              <a:lnSpc>
+                <a:spcPts val="8959"/>
+              </a:lnSpc>
+            </a:pPr>
+            <a:r>
+              <a:rPr lang="en-US" sz="6399">
+                <a:solidFill>
+                  <a:srgbClr val="509FCB"/>
+                </a:solidFill>
+                <a:latin typeface="Roboto Condensed Bold"/>
+              </a:rPr>
+              <a:t>Hunting</a:t>
+            </a:r>
+          </a:p>
+        </p:txBody>
+      </p:sp>
+      <p:sp>
+        <p:nvSpPr>
+          <p:cNvPr name="TextBox 9" id="9"/>
+          <p:cNvSpPr txBox="true"/>
+          <p:nvPr/>
+        </p:nvSpPr>
+        <p:spPr>
+          <a:xfrm rot="0">
             <a:off x="8795563" y="1527309"/>
-            <a:ext cx="5381356" cy="1104265"/>
+            <a:ext cx="2277365" cy="1104265"/>
           </a:xfrm>
           <a:prstGeom prst="rect">
             <a:avLst/>
@@ -8871,21 +8582,21 @@
                 </a:solidFill>
                 <a:latin typeface="Roboto Condensed Bold"/>
               </a:rPr>
-              <a:t>Vulnerabilities</a:t>
+              <a:t>Threat</a:t>
             </a:r>
           </a:p>
         </p:txBody>
       </p:sp>
       <p:sp>
         <p:nvSpPr>
-          <p:cNvPr name="TextBox 9" id="9"/>
+          <p:cNvPr name="TextBox 10" id="10"/>
           <p:cNvSpPr txBox="true"/>
           <p:nvPr/>
         </p:nvSpPr>
         <p:spPr>
           <a:xfrm rot="0">
-            <a:off x="8795563" y="2801138"/>
-            <a:ext cx="8277849" cy="679450"/>
+            <a:off x="8795563" y="3841440"/>
+            <a:ext cx="9205875" cy="3200400"/>
           </a:xfrm>
           <a:prstGeom prst="rect">
             <a:avLst/>
@@ -8899,47 +8610,18 @@
           <a:p>
             <a:pPr>
               <a:lnSpc>
-                <a:spcPts val="5599"/>
-              </a:lnSpc>
-            </a:pPr>
-            <a:r>
-              <a:rPr lang="en-US" sz="3999">
-                <a:solidFill>
-                  <a:srgbClr val="B6E4FD"/>
-                </a:solidFill>
-                <a:latin typeface="Roboto Condensed"/>
-              </a:rPr>
-              <a:t>ON-PREMISES VULNERABILITIES</a:t>
-            </a:r>
-          </a:p>
-        </p:txBody>
-      </p:sp>
-      <p:sp>
-        <p:nvSpPr>
-          <p:cNvPr name="TextBox 10" id="10"/>
-          <p:cNvSpPr txBox="true"/>
-          <p:nvPr/>
-        </p:nvSpPr>
-        <p:spPr>
-          <a:xfrm rot="0">
-            <a:off x="8795563" y="3841440"/>
-            <a:ext cx="9205875" cy="2667000"/>
-          </a:xfrm>
-          <a:prstGeom prst="rect">
-            <a:avLst/>
-          </a:prstGeom>
-        </p:spPr>
-        <p:txBody>
-          <a:bodyPr anchor="t" rtlCol="false" tIns="0" lIns="0" bIns="0" rIns="0">
-            <a:spAutoFit/>
-          </a:bodyPr>
-          <a:lstStyle/>
-          <a:p>
-            <a:pPr>
-              <a:lnSpc>
                 <a:spcPts val="4200"/>
               </a:lnSpc>
             </a:pPr>
+            <a:r>
+              <a:rPr lang="en-US" sz="3000">
+                <a:solidFill>
+                  <a:srgbClr val="FFFFFF"/>
+                </a:solidFill>
+                <a:latin typeface="Roboto Condensed Italics"/>
+              </a:rPr>
+              <a:t>Threat hunting </a:t>
+            </a:r>
             <a:r>
               <a:rPr lang="en-US" sz="3000">
                 <a:solidFill>
@@ -8947,25 +8629,7 @@
                 </a:solidFill>
                 <a:latin typeface="Roboto Condensed"/>
               </a:rPr>
-              <a:t>With </a:t>
-            </a:r>
-            <a:r>
-              <a:rPr lang="en-US" sz="3000">
-                <a:solidFill>
-                  <a:srgbClr val="FFFFFF"/>
-                </a:solidFill>
-                <a:latin typeface="Roboto Condensed Italics"/>
-              </a:rPr>
-              <a:t>on-premises vulnerabilities</a:t>
-            </a:r>
-            <a:r>
-              <a:rPr lang="en-US" sz="3000">
-                <a:solidFill>
-                  <a:srgbClr val="FFFFFF"/>
-                </a:solidFill>
-                <a:latin typeface="Roboto Condensed"/>
-              </a:rPr>
-              <a:t>, the enterprise has unfettered access to the infrastructure elements, making the discovery and remediation of vulnerabilities a problem defined by scope and resources. </a:t>
+              <a:t>is the practice of proactively searching for cyber threats that are inside a network, yet remain undetected. Cyber threat hunting uses tools, techniques, and procedures (TTPs) to uncover unauthorized actors in your network that have not been detected by your defenses.</a:t>
             </a:r>
           </a:p>
           <a:p>
@@ -9319,7 +8983,7 @@
         <p:spPr>
           <a:xfrm rot="0">
             <a:off x="8795563" y="1527309"/>
-            <a:ext cx="3081634" cy="1104265"/>
+            <a:ext cx="5072582" cy="1104265"/>
           </a:xfrm>
           <a:prstGeom prst="rect">
             <a:avLst/>
@@ -9343,7 +9007,7 @@
                 </a:solidFill>
                 <a:latin typeface="Roboto Condensed Bold"/>
               </a:rPr>
-              <a:t>Impacts</a:t>
+              <a:t>SIEM</a:t>
             </a:r>
           </a:p>
         </p:txBody>
@@ -9357,7 +9021,7 @@
         <p:spPr>
           <a:xfrm rot="0">
             <a:off x="8795563" y="3841440"/>
-            <a:ext cx="9205875" cy="3733800"/>
+            <a:ext cx="9205875" cy="2133600"/>
           </a:xfrm>
           <a:prstGeom prst="rect">
             <a:avLst/>
@@ -9374,6 +9038,15 @@
                 <a:spcPts val="4200"/>
               </a:lnSpc>
             </a:pPr>
+            <a:r>
+              <a:rPr lang="en-US" sz="3000">
+                <a:solidFill>
+                  <a:srgbClr val="FFFFFF"/>
+                </a:solidFill>
+                <a:latin typeface="Roboto Condensed"/>
+              </a:rPr>
+              <a:t>Advances in </a:t>
+            </a:r>
             <a:r>
               <a:rPr lang="en-US" sz="3000">
                 <a:solidFill>
@@ -9381,7 +9054,7 @@
                 </a:solidFill>
                 <a:latin typeface="Roboto Condensed Italics"/>
               </a:rPr>
-              <a:t>Data loss </a:t>
+              <a:t>user behavioral analysis </a:t>
             </a:r>
             <a:r>
               <a:rPr lang="en-US" sz="3000">
@@ -9390,7 +9063,7 @@
                 </a:solidFill>
                 <a:latin typeface="Roboto Condensed"/>
               </a:rPr>
-              <a:t>is when an organization actually loses information. Files can be deleted, overwritten, or even misplaced. Ransomware is the most dangerous form of data loss because it is driven by outside forces and its very nature is to make the data unavailable to the enterprise until a ransom is paid.</a:t>
+              <a:t>has provided another interesting use of the SIEM: monitoring what people do with their systems and how they do it.</a:t>
             </a:r>
           </a:p>
           <a:p>
@@ -9399,44 +9072,6 @@
                 <a:spcPts val="4200"/>
               </a:lnSpc>
             </a:pPr>
-          </a:p>
-        </p:txBody>
-      </p:sp>
-      <p:sp>
-        <p:nvSpPr>
-          <p:cNvPr name="TextBox 10" id="10"/>
-          <p:cNvSpPr txBox="true"/>
-          <p:nvPr/>
-        </p:nvSpPr>
-        <p:spPr>
-          <a:xfrm rot="0">
-            <a:off x="8795563" y="2801138"/>
-            <a:ext cx="8099085" cy="679450"/>
-          </a:xfrm>
-          <a:prstGeom prst="rect">
-            <a:avLst/>
-          </a:prstGeom>
-        </p:spPr>
-        <p:txBody>
-          <a:bodyPr anchor="t" rtlCol="false" tIns="0" lIns="0" bIns="0" rIns="0">
-            <a:spAutoFit/>
-          </a:bodyPr>
-          <a:lstStyle/>
-          <a:p>
-            <a:pPr>
-              <a:lnSpc>
-                <a:spcPts val="5599"/>
-              </a:lnSpc>
-            </a:pPr>
-            <a:r>
-              <a:rPr lang="en-US" sz="3999">
-                <a:solidFill>
-                  <a:srgbClr val="B6E4FD"/>
-                </a:solidFill>
-                <a:latin typeface="Roboto Condensed"/>
-              </a:rPr>
-              <a:t>Data loss</a:t>
-            </a:r>
           </a:p>
         </p:txBody>
       </p:sp>
@@ -9782,7 +9417,7 @@
         <p:spPr>
           <a:xfrm rot="0">
             <a:off x="8795563" y="1527309"/>
-            <a:ext cx="3081634" cy="1104265"/>
+            <a:ext cx="5072582" cy="1104265"/>
           </a:xfrm>
           <a:prstGeom prst="rect">
             <a:avLst/>
@@ -9806,7 +9441,7 @@
                 </a:solidFill>
                 <a:latin typeface="Roboto Condensed Bold"/>
               </a:rPr>
-              <a:t>Impacts</a:t>
+              <a:t>SIEM</a:t>
             </a:r>
           </a:p>
         </p:txBody>
@@ -9820,7 +9455,7 @@
         <p:spPr>
           <a:xfrm rot="0">
             <a:off x="8795563" y="3841440"/>
-            <a:ext cx="9205875" cy="3200400"/>
+            <a:ext cx="9205875" cy="4267200"/>
           </a:xfrm>
           <a:prstGeom prst="rect">
             <a:avLst/>
@@ -9837,6 +9472,15 @@
                 <a:spcPts val="4200"/>
               </a:lnSpc>
             </a:pPr>
+            <a:r>
+              <a:rPr lang="en-US" sz="3000">
+                <a:solidFill>
+                  <a:srgbClr val="FFFFFF"/>
+                </a:solidFill>
+                <a:latin typeface="Roboto Condensed"/>
+              </a:rPr>
+              <a:t>The same systems that are used to pattern-match security issues can be adapted to match patterns of data indicating specific </a:t>
+            </a:r>
             <a:r>
               <a:rPr lang="en-US" sz="3000">
                 <a:solidFill>
@@ -9844,7 +9488,7 @@
                 </a:solidFill>
                 <a:latin typeface="Roboto Condensed Italics"/>
               </a:rPr>
-              <a:t>Data breaches </a:t>
+              <a:t>sentiments</a:t>
             </a:r>
             <a:r>
               <a:rPr lang="en-US" sz="3000">
@@ -9853,7 +9497,7 @@
                 </a:solidFill>
                 <a:latin typeface="Roboto Condensed"/>
               </a:rPr>
-              <a:t>are the release of data to unauthorized parties. Attackers that infiltrate a system are frequently looking to steal information such as personally identifiable information (PII), financial data, corporate data with value on the open market, and intellectual property.</a:t>
+              <a:t>. Approximations of sentiment can be determined by using inputs such as emails, chats, feedback collection mechanisms, and social media communications, coupled with AI systems that can interpret text communications.</a:t>
             </a:r>
           </a:p>
           <a:p>
@@ -9862,44 +9506,6 @@
                 <a:spcPts val="4200"/>
               </a:lnSpc>
             </a:pPr>
-          </a:p>
-        </p:txBody>
-      </p:sp>
-      <p:sp>
-        <p:nvSpPr>
-          <p:cNvPr name="TextBox 10" id="10"/>
-          <p:cNvSpPr txBox="true"/>
-          <p:nvPr/>
-        </p:nvSpPr>
-        <p:spPr>
-          <a:xfrm rot="0">
-            <a:off x="8795563" y="2801138"/>
-            <a:ext cx="8099085" cy="679450"/>
-          </a:xfrm>
-          <a:prstGeom prst="rect">
-            <a:avLst/>
-          </a:prstGeom>
-        </p:spPr>
-        <p:txBody>
-          <a:bodyPr anchor="t" rtlCol="false" tIns="0" lIns="0" bIns="0" rIns="0">
-            <a:spAutoFit/>
-          </a:bodyPr>
-          <a:lstStyle/>
-          <a:p>
-            <a:pPr>
-              <a:lnSpc>
-                <a:spcPts val="5599"/>
-              </a:lnSpc>
-            </a:pPr>
-            <a:r>
-              <a:rPr lang="en-US" sz="3999">
-                <a:solidFill>
-                  <a:srgbClr val="B6E4FD"/>
-                </a:solidFill>
-                <a:latin typeface="Roboto Condensed"/>
-              </a:rPr>
-              <a:t>Data breaches</a:t>
-            </a:r>
           </a:p>
         </p:txBody>
       </p:sp>
@@ -10245,7 +9851,7 @@
         <p:spPr>
           <a:xfrm rot="0">
             <a:off x="8795563" y="1527309"/>
-            <a:ext cx="3081634" cy="1104265"/>
+            <a:ext cx="5072582" cy="1104265"/>
           </a:xfrm>
           <a:prstGeom prst="rect">
             <a:avLst/>
@@ -10269,7 +9875,7 @@
                 </a:solidFill>
                 <a:latin typeface="Roboto Condensed Bold"/>
               </a:rPr>
-              <a:t>Impacts</a:t>
+              <a:t>SIEM</a:t>
             </a:r>
           </a:p>
         </p:txBody>
@@ -10307,7 +9913,7 @@
                 </a:solidFill>
                 <a:latin typeface="Roboto Condensed Italics"/>
               </a:rPr>
-              <a:t>Data exfiltration </a:t>
+              <a:t>Security monitoring </a:t>
             </a:r>
             <a:r>
               <a:rPr lang="en-US" sz="3000">
@@ -10316,7 +9922,7 @@
                 </a:solidFill>
                 <a:latin typeface="Roboto Condensed"/>
               </a:rPr>
-              <a:t>is the exporting of stolen data from an enterprise. Data exfiltration impact is related to the data being stolen. If it is intellectual property, then the impact can be directly to the bottom line. Loss of intellectual property can result in loss of future sales. </a:t>
+              <a:t>is the process of collecting and analyzing information to detect suspicious behavior or unauthorized changes on your network and connected systems. This implies a process of defining which types of behavior should trigger alerts.</a:t>
             </a:r>
           </a:p>
           <a:p>
@@ -10325,44 +9931,6 @@
                 <a:spcPts val="4200"/>
               </a:lnSpc>
             </a:pPr>
-          </a:p>
-        </p:txBody>
-      </p:sp>
-      <p:sp>
-        <p:nvSpPr>
-          <p:cNvPr name="TextBox 10" id="10"/>
-          <p:cNvSpPr txBox="true"/>
-          <p:nvPr/>
-        </p:nvSpPr>
-        <p:spPr>
-          <a:xfrm rot="0">
-            <a:off x="8795563" y="2801138"/>
-            <a:ext cx="8099085" cy="679450"/>
-          </a:xfrm>
-          <a:prstGeom prst="rect">
-            <a:avLst/>
-          </a:prstGeom>
-        </p:spPr>
-        <p:txBody>
-          <a:bodyPr anchor="t" rtlCol="false" tIns="0" lIns="0" bIns="0" rIns="0">
-            <a:spAutoFit/>
-          </a:bodyPr>
-          <a:lstStyle/>
-          <a:p>
-            <a:pPr>
-              <a:lnSpc>
-                <a:spcPts val="5599"/>
-              </a:lnSpc>
-            </a:pPr>
-            <a:r>
-              <a:rPr lang="en-US" sz="3999">
-                <a:solidFill>
-                  <a:srgbClr val="B6E4FD"/>
-                </a:solidFill>
-                <a:latin typeface="Roboto Condensed"/>
-              </a:rPr>
-              <a:t>DATA EXFILTRATION</a:t>
-            </a:r>
           </a:p>
         </p:txBody>
       </p:sp>
@@ -10708,7 +10276,7 @@
         <p:spPr>
           <a:xfrm rot="0">
             <a:off x="8795563" y="1527309"/>
-            <a:ext cx="3081634" cy="1104265"/>
+            <a:ext cx="5072582" cy="1104265"/>
           </a:xfrm>
           <a:prstGeom prst="rect">
             <a:avLst/>
@@ -10732,7 +10300,7 @@
                 </a:solidFill>
                 <a:latin typeface="Roboto Condensed Bold"/>
               </a:rPr>
-              <a:t>Impacts</a:t>
+              <a:t>SIEM</a:t>
             </a:r>
           </a:p>
         </p:txBody>
@@ -10770,7 +10338,7 @@
                 </a:solidFill>
                 <a:latin typeface="Roboto Condensed Italics"/>
               </a:rPr>
-              <a:t>Identity theft </a:t>
+              <a:t>Log aggregation </a:t>
             </a:r>
             <a:r>
               <a:rPr lang="en-US" sz="3000">
@@ -10779,7 +10347,7 @@
                 </a:solidFill>
                 <a:latin typeface="Roboto Condensed"/>
               </a:rPr>
-              <a:t>is a crime where someone uses information on another party to impersonate them. This is a secondary impact once data is exfiltrated. The loss of data can come from commercial systems and even home systems, and the results are the same: people can lose money, property, and time cleaning up an identity theft claim.</a:t>
+              <a:t>is the process of combining logs together. This is done to allow different formats from different systems to work together. Log aggregation works to allow multiple independent sources of information to be connected together in a more comprehensive picture of the system state than a single data source could provide.</a:t>
             </a:r>
           </a:p>
           <a:p>
@@ -10788,44 +10356,6 @@
                 <a:spcPts val="4200"/>
               </a:lnSpc>
             </a:pPr>
-          </a:p>
-        </p:txBody>
-      </p:sp>
-      <p:sp>
-        <p:nvSpPr>
-          <p:cNvPr name="TextBox 10" id="10"/>
-          <p:cNvSpPr txBox="true"/>
-          <p:nvPr/>
-        </p:nvSpPr>
-        <p:spPr>
-          <a:xfrm rot="0">
-            <a:off x="8795563" y="2801138"/>
-            <a:ext cx="8099085" cy="679450"/>
-          </a:xfrm>
-          <a:prstGeom prst="rect">
-            <a:avLst/>
-          </a:prstGeom>
-        </p:spPr>
-        <p:txBody>
-          <a:bodyPr anchor="t" rtlCol="false" tIns="0" lIns="0" bIns="0" rIns="0">
-            <a:spAutoFit/>
-          </a:bodyPr>
-          <a:lstStyle/>
-          <a:p>
-            <a:pPr>
-              <a:lnSpc>
-                <a:spcPts val="5599"/>
-              </a:lnSpc>
-            </a:pPr>
-            <a:r>
-              <a:rPr lang="en-US" sz="3999">
-                <a:solidFill>
-                  <a:srgbClr val="B6E4FD"/>
-                </a:solidFill>
-                <a:latin typeface="Roboto Condensed"/>
-              </a:rPr>
-              <a:t>IDENTITY THEFT </a:t>
-            </a:r>
           </a:p>
         </p:txBody>
       </p:sp>
@@ -11171,7 +10701,7 @@
         <p:spPr>
           <a:xfrm rot="0">
             <a:off x="8795563" y="1527309"/>
-            <a:ext cx="3081634" cy="1104265"/>
+            <a:ext cx="5072582" cy="1104265"/>
           </a:xfrm>
           <a:prstGeom prst="rect">
             <a:avLst/>
@@ -11195,7 +10725,7 @@
                 </a:solidFill>
                 <a:latin typeface="Roboto Condensed Bold"/>
               </a:rPr>
-              <a:t>Impacts</a:t>
+              <a:t>SOAR</a:t>
             </a:r>
           </a:p>
         </p:txBody>
@@ -11209,7 +10739,7 @@
         <p:spPr>
           <a:xfrm rot="0">
             <a:off x="8795563" y="3841440"/>
-            <a:ext cx="9205875" cy="3733800"/>
+            <a:ext cx="9205875" cy="2133600"/>
           </a:xfrm>
           <a:prstGeom prst="rect">
             <a:avLst/>
@@ -11226,6 +10756,15 @@
                 <a:spcPts val="4200"/>
               </a:lnSpc>
             </a:pPr>
+            <a:r>
+              <a:rPr lang="en-US" sz="3000">
+                <a:solidFill>
+                  <a:srgbClr val="FFFFFF"/>
+                </a:solidFill>
+                <a:latin typeface="Roboto Condensed Italics"/>
+              </a:rPr>
+              <a:t>Security orchestration, automation, and response (SOAR) systems </a:t>
+            </a:r>
             <a:r>
               <a:rPr lang="en-US" sz="3000">
                 <a:solidFill>
@@ -11233,25 +10772,7 @@
                 </a:solidFill>
                 <a:latin typeface="Roboto Condensed"/>
               </a:rPr>
-              <a:t>At the end of the day, risk is measured in </a:t>
-            </a:r>
-            <a:r>
-              <a:rPr lang="en-US" sz="3000">
-                <a:solidFill>
-                  <a:srgbClr val="FFFFFF"/>
-                </a:solidFill>
-                <a:latin typeface="Roboto Condensed Italics"/>
-              </a:rPr>
-              <a:t>financial</a:t>
-            </a:r>
-            <a:r>
-              <a:rPr lang="en-US" sz="3000">
-                <a:solidFill>
-                  <a:srgbClr val="FFFFFF"/>
-                </a:solidFill>
-                <a:latin typeface="Roboto Condensed"/>
-              </a:rPr>
-              <a:t> terms, and the impact from vulnerabilities can be expressed in financial terms as well. While it is sometimes difficult to directly trace each issue to a financial figure, there have been numerous examples where the results are easy to connect to the financials.</a:t>
+              <a:t>take SIEM data as well as data from other sources and assist in the creation of runbooks and playbooks.</a:t>
             </a:r>
           </a:p>
           <a:p>
@@ -11260,44 +10781,6 @@
                 <a:spcPts val="4200"/>
               </a:lnSpc>
             </a:pPr>
-          </a:p>
-        </p:txBody>
-      </p:sp>
-      <p:sp>
-        <p:nvSpPr>
-          <p:cNvPr name="TextBox 10" id="10"/>
-          <p:cNvSpPr txBox="true"/>
-          <p:nvPr/>
-        </p:nvSpPr>
-        <p:spPr>
-          <a:xfrm rot="0">
-            <a:off x="8795563" y="2801138"/>
-            <a:ext cx="8099085" cy="679450"/>
-          </a:xfrm>
-          <a:prstGeom prst="rect">
-            <a:avLst/>
-          </a:prstGeom>
-        </p:spPr>
-        <p:txBody>
-          <a:bodyPr anchor="t" rtlCol="false" tIns="0" lIns="0" bIns="0" rIns="0">
-            <a:spAutoFit/>
-          </a:bodyPr>
-          <a:lstStyle/>
-          <a:p>
-            <a:pPr>
-              <a:lnSpc>
-                <a:spcPts val="5599"/>
-              </a:lnSpc>
-            </a:pPr>
-            <a:r>
-              <a:rPr lang="en-US" sz="3999">
-                <a:solidFill>
-                  <a:srgbClr val="B6E4FD"/>
-                </a:solidFill>
-                <a:latin typeface="Roboto Condensed"/>
-              </a:rPr>
-              <a:t>FINANCES</a:t>
-            </a:r>
           </a:p>
         </p:txBody>
       </p:sp>
@@ -11385,469 +10868,6 @@
           </a:blipFill>
         </p:spPr>
       </p:sp>
-      <p:grpSp>
-        <p:nvGrpSpPr>
-          <p:cNvPr name="Group 3" id="3"/>
-          <p:cNvGrpSpPr>
-            <a:grpSpLocks noChangeAspect="true"/>
-          </p:cNvGrpSpPr>
-          <p:nvPr/>
-        </p:nvGrpSpPr>
-        <p:grpSpPr>
-          <a:xfrm rot="0">
-            <a:off x="1028700" y="1660659"/>
-            <a:ext cx="6965682" cy="6965682"/>
-            <a:chOff x="0" y="0"/>
-            <a:chExt cx="6350000" cy="6350000"/>
-          </a:xfrm>
-        </p:grpSpPr>
-        <p:sp>
-          <p:nvSpPr>
-            <p:cNvPr name="Freeform 4" id="4"/>
-            <p:cNvSpPr/>
-            <p:nvPr/>
-          </p:nvSpPr>
-          <p:spPr>
-            <a:xfrm flipH="false" flipV="false" rot="0">
-              <a:off x="-156812" y="-5088"/>
-              <a:ext cx="6663624" cy="6360176"/>
-            </a:xfrm>
-            <a:custGeom>
-              <a:avLst/>
-              <a:gdLst/>
-              <a:ahLst/>
-              <a:cxnLst/>
-              <a:rect r="r" b="b" t="t" l="l"/>
-              <a:pathLst>
-                <a:path h="6360176" w="6663624">
-                  <a:moveTo>
-                    <a:pt x="3331812" y="5088"/>
-                  </a:moveTo>
-                  <a:lnTo>
-                    <a:pt x="3331812" y="5088"/>
-                  </a:lnTo>
-                  <a:cubicBezTo>
-                    <a:pt x="2194111" y="0"/>
-                    <a:pt x="1140649" y="604036"/>
-                    <a:pt x="570324" y="1588475"/>
-                  </a:cubicBezTo>
-                  <a:cubicBezTo>
-                    <a:pt x="0" y="2572913"/>
-                    <a:pt x="0" y="3787263"/>
-                    <a:pt x="570324" y="4771701"/>
-                  </a:cubicBezTo>
-                  <a:cubicBezTo>
-                    <a:pt x="1140649" y="5756140"/>
-                    <a:pt x="2194111" y="6360176"/>
-                    <a:pt x="3331812" y="6355088"/>
-                  </a:cubicBezTo>
-                  <a:cubicBezTo>
-                    <a:pt x="4469513" y="6360176"/>
-                    <a:pt x="5522976" y="5756140"/>
-                    <a:pt x="6093300" y="4771701"/>
-                  </a:cubicBezTo>
-                  <a:cubicBezTo>
-                    <a:pt x="6663624" y="3787263"/>
-                    <a:pt x="6663624" y="2572913"/>
-                    <a:pt x="6093300" y="1588475"/>
-                  </a:cubicBezTo>
-                  <a:cubicBezTo>
-                    <a:pt x="5522976" y="604036"/>
-                    <a:pt x="4469513" y="0"/>
-                    <a:pt x="3331812" y="5088"/>
-                  </a:cubicBezTo>
-                  <a:close/>
-                </a:path>
-              </a:pathLst>
-            </a:custGeom>
-            <a:solidFill>
-              <a:srgbClr val="2B6993"/>
-            </a:solidFill>
-          </p:spPr>
-        </p:sp>
-        <p:sp>
-          <p:nvSpPr>
-            <p:cNvPr name="Freeform 5" id="5"/>
-            <p:cNvSpPr/>
-            <p:nvPr/>
-          </p:nvSpPr>
-          <p:spPr>
-            <a:xfrm flipH="false" flipV="false" rot="0">
-              <a:off x="284320" y="415956"/>
-              <a:ext cx="5781360" cy="5518089"/>
-            </a:xfrm>
-            <a:custGeom>
-              <a:avLst/>
-              <a:gdLst/>
-              <a:ahLst/>
-              <a:cxnLst/>
-              <a:rect r="r" b="b" t="t" l="l"/>
-              <a:pathLst>
-                <a:path h="5518089" w="5781360">
-                  <a:moveTo>
-                    <a:pt x="2890680" y="4414"/>
-                  </a:moveTo>
-                  <a:cubicBezTo>
-                    <a:pt x="1903611" y="0"/>
-                    <a:pt x="989627" y="524062"/>
-                    <a:pt x="494813" y="1378160"/>
-                  </a:cubicBezTo>
-                  <a:cubicBezTo>
-                    <a:pt x="0" y="2232259"/>
-                    <a:pt x="0" y="3285829"/>
-                    <a:pt x="494813" y="4139928"/>
-                  </a:cubicBezTo>
-                  <a:cubicBezTo>
-                    <a:pt x="989627" y="4994026"/>
-                    <a:pt x="1903611" y="5518088"/>
-                    <a:pt x="2890680" y="5513674"/>
-                  </a:cubicBezTo>
-                  <a:cubicBezTo>
-                    <a:pt x="3877749" y="5518088"/>
-                    <a:pt x="4791733" y="4994026"/>
-                    <a:pt x="5286547" y="4139928"/>
-                  </a:cubicBezTo>
-                  <a:cubicBezTo>
-                    <a:pt x="5781360" y="3285829"/>
-                    <a:pt x="5781360" y="2232259"/>
-                    <a:pt x="5286547" y="1378161"/>
-                  </a:cubicBezTo>
-                  <a:cubicBezTo>
-                    <a:pt x="4791733" y="524062"/>
-                    <a:pt x="3877749" y="0"/>
-                    <a:pt x="2890680" y="4414"/>
-                  </a:cubicBezTo>
-                  <a:close/>
-                </a:path>
-              </a:pathLst>
-            </a:custGeom>
-            <a:blipFill>
-              <a:blip r:embed="rId4"/>
-              <a:stretch>
-                <a:fillRect l="-33765" t="-394" r="-37646" b="-14318"/>
-              </a:stretch>
-            </a:blipFill>
-          </p:spPr>
-        </p:sp>
-      </p:grpSp>
-      <p:sp>
-        <p:nvSpPr>
-          <p:cNvPr name="Freeform 6" id="6"/>
-          <p:cNvSpPr/>
-          <p:nvPr/>
-        </p:nvSpPr>
-        <p:spPr>
-          <a:xfrm flipH="false" flipV="false" rot="8803574">
-            <a:off x="-3229007" y="4942016"/>
-            <a:ext cx="8106264" cy="8524787"/>
-          </a:xfrm>
-          <a:custGeom>
-            <a:avLst/>
-            <a:gdLst/>
-            <a:ahLst/>
-            <a:cxnLst/>
-            <a:rect r="r" b="b" t="t" l="l"/>
-            <a:pathLst>
-              <a:path h="8524787" w="8106264">
-                <a:moveTo>
-                  <a:pt x="0" y="0"/>
-                </a:moveTo>
-                <a:lnTo>
-                  <a:pt x="8106264" y="0"/>
-                </a:lnTo>
-                <a:lnTo>
-                  <a:pt x="8106264" y="8524786"/>
-                </a:lnTo>
-                <a:lnTo>
-                  <a:pt x="0" y="8524786"/>
-                </a:lnTo>
-                <a:lnTo>
-                  <a:pt x="0" y="0"/>
-                </a:lnTo>
-                <a:close/>
-              </a:path>
-            </a:pathLst>
-          </a:custGeom>
-          <a:blipFill>
-            <a:blip r:embed="rId5">
-              <a:extLst>
-                <a:ext uri="{96DAC541-7B7A-43D3-8B79-37D633B846F1}">
-                  <asvg:svgBlip xmlns:asvg="http://schemas.microsoft.com/office/drawing/2016/SVG/main" r:embed="rId6"/>
-                </a:ext>
-              </a:extLst>
-            </a:blip>
-            <a:stretch>
-              <a:fillRect l="0" t="0" r="0" b="-44624"/>
-            </a:stretch>
-          </a:blipFill>
-        </p:spPr>
-      </p:sp>
-      <p:sp>
-        <p:nvSpPr>
-          <p:cNvPr name="Freeform 7" id="7"/>
-          <p:cNvSpPr/>
-          <p:nvPr/>
-        </p:nvSpPr>
-        <p:spPr>
-          <a:xfrm flipH="false" flipV="false" rot="-5639383">
-            <a:off x="-2623104" y="-3403514"/>
-            <a:ext cx="8106264" cy="6807027"/>
-          </a:xfrm>
-          <a:custGeom>
-            <a:avLst/>
-            <a:gdLst/>
-            <a:ahLst/>
-            <a:cxnLst/>
-            <a:rect r="r" b="b" t="t" l="l"/>
-            <a:pathLst>
-              <a:path h="6807027" w="8106264">
-                <a:moveTo>
-                  <a:pt x="0" y="0"/>
-                </a:moveTo>
-                <a:lnTo>
-                  <a:pt x="8106263" y="0"/>
-                </a:lnTo>
-                <a:lnTo>
-                  <a:pt x="8106263" y="6807028"/>
-                </a:lnTo>
-                <a:lnTo>
-                  <a:pt x="0" y="6807028"/>
-                </a:lnTo>
-                <a:lnTo>
-                  <a:pt x="0" y="0"/>
-                </a:lnTo>
-                <a:close/>
-              </a:path>
-            </a:pathLst>
-          </a:custGeom>
-          <a:blipFill>
-            <a:blip r:embed="rId5">
-              <a:extLst>
-                <a:ext uri="{96DAC541-7B7A-43D3-8B79-37D633B846F1}">
-                  <asvg:svgBlip xmlns:asvg="http://schemas.microsoft.com/office/drawing/2016/SVG/main" r:embed="rId6"/>
-                </a:ext>
-              </a:extLst>
-            </a:blip>
-            <a:stretch>
-              <a:fillRect l="0" t="0" r="0" b="-81120"/>
-            </a:stretch>
-          </a:blipFill>
-        </p:spPr>
-      </p:sp>
-      <p:sp>
-        <p:nvSpPr>
-          <p:cNvPr name="TextBox 8" id="8"/>
-          <p:cNvSpPr txBox="true"/>
-          <p:nvPr/>
-        </p:nvSpPr>
-        <p:spPr>
-          <a:xfrm rot="0">
-            <a:off x="8795563" y="1527309"/>
-            <a:ext cx="3081634" cy="1104265"/>
-          </a:xfrm>
-          <a:prstGeom prst="rect">
-            <a:avLst/>
-          </a:prstGeom>
-        </p:spPr>
-        <p:txBody>
-          <a:bodyPr anchor="t" rtlCol="false" tIns="0" lIns="0" bIns="0" rIns="0">
-            <a:spAutoFit/>
-          </a:bodyPr>
-          <a:lstStyle/>
-          <a:p>
-            <a:pPr>
-              <a:lnSpc>
-                <a:spcPts val="8959"/>
-              </a:lnSpc>
-            </a:pPr>
-            <a:r>
-              <a:rPr lang="en-US" sz="6399">
-                <a:solidFill>
-                  <a:srgbClr val="D9EAF3"/>
-                </a:solidFill>
-                <a:latin typeface="Roboto Condensed Bold"/>
-              </a:rPr>
-              <a:t>Impacts</a:t>
-            </a:r>
-          </a:p>
-        </p:txBody>
-      </p:sp>
-      <p:sp>
-        <p:nvSpPr>
-          <p:cNvPr name="TextBox 9" id="9"/>
-          <p:cNvSpPr txBox="true"/>
-          <p:nvPr/>
-        </p:nvSpPr>
-        <p:spPr>
-          <a:xfrm rot="0">
-            <a:off x="8795563" y="3841440"/>
-            <a:ext cx="9205875" cy="3733800"/>
-          </a:xfrm>
-          <a:prstGeom prst="rect">
-            <a:avLst/>
-          </a:prstGeom>
-        </p:spPr>
-        <p:txBody>
-          <a:bodyPr anchor="t" rtlCol="false" tIns="0" lIns="0" bIns="0" rIns="0">
-            <a:spAutoFit/>
-          </a:bodyPr>
-          <a:lstStyle/>
-          <a:p>
-            <a:pPr>
-              <a:lnSpc>
-                <a:spcPts val="4200"/>
-              </a:lnSpc>
-            </a:pPr>
-            <a:r>
-              <a:rPr lang="en-US" sz="3000">
-                <a:solidFill>
-                  <a:srgbClr val="FFFFFF"/>
-                </a:solidFill>
-                <a:latin typeface="Roboto Condensed Italics"/>
-              </a:rPr>
-              <a:t>Availability</a:t>
-            </a:r>
-            <a:r>
-              <a:rPr lang="en-US" sz="3000">
-                <a:solidFill>
-                  <a:srgbClr val="FFFFFF"/>
-                </a:solidFill>
-                <a:latin typeface="Roboto Condensed"/>
-              </a:rPr>
-              <a:t> is defined as resources being available for authorized users when they are supposed to be available. When the impact of a cyber attack affects infrastructure elements, either by system damage, data loss, or loss of systems during recovery efforts, the effect is one that results in the loss of system capability.</a:t>
-            </a:r>
-          </a:p>
-          <a:p>
-            <a:pPr>
-              <a:lnSpc>
-                <a:spcPts val="4200"/>
-              </a:lnSpc>
-            </a:pPr>
-          </a:p>
-        </p:txBody>
-      </p:sp>
-      <p:sp>
-        <p:nvSpPr>
-          <p:cNvPr name="TextBox 10" id="10"/>
-          <p:cNvSpPr txBox="true"/>
-          <p:nvPr/>
-        </p:nvSpPr>
-        <p:spPr>
-          <a:xfrm rot="0">
-            <a:off x="8795563" y="2801138"/>
-            <a:ext cx="8099085" cy="679450"/>
-          </a:xfrm>
-          <a:prstGeom prst="rect">
-            <a:avLst/>
-          </a:prstGeom>
-        </p:spPr>
-        <p:txBody>
-          <a:bodyPr anchor="t" rtlCol="false" tIns="0" lIns="0" bIns="0" rIns="0">
-            <a:spAutoFit/>
-          </a:bodyPr>
-          <a:lstStyle/>
-          <a:p>
-            <a:pPr>
-              <a:lnSpc>
-                <a:spcPts val="5599"/>
-              </a:lnSpc>
-            </a:pPr>
-            <a:r>
-              <a:rPr lang="en-US" sz="3999">
-                <a:solidFill>
-                  <a:srgbClr val="B6E4FD"/>
-                </a:solidFill>
-                <a:latin typeface="Roboto Condensed"/>
-              </a:rPr>
-              <a:t>AVAILABILITY</a:t>
-            </a:r>
-          </a:p>
-        </p:txBody>
-      </p:sp>
-    </p:spTree>
-  </p:cSld>
-  <p:clrMapOvr>
-    <a:masterClrMapping/>
-  </p:clrMapOvr>
-</p:sld>
-</file>
-
-<file path=ppt/slides/slide26.xml><?xml version="1.0" encoding="utf-8"?>
-<p:sld xmlns:p="http://schemas.openxmlformats.org/presentationml/2006/main" xmlns:a="http://schemas.openxmlformats.org/drawingml/2006/main" xmlns:r="http://schemas.openxmlformats.org/officeDocument/2006/relationships">
-  <p:cSld>
-    <p:bg>
-      <p:bgPr>
-        <a:solidFill>
-          <a:srgbClr val="04314C"/>
-        </a:solidFill>
-      </p:bgPr>
-    </p:bg>
-    <p:spTree>
-      <p:nvGrpSpPr>
-        <p:cNvPr id="1" name=""/>
-        <p:cNvGrpSpPr/>
-        <p:nvPr/>
-      </p:nvGrpSpPr>
-      <p:grpSpPr>
-        <a:xfrm>
-          <a:off x="0" y="0"/>
-          <a:ext cx="0" cy="0"/>
-          <a:chOff x="0" y="0"/>
-          <a:chExt cx="0" cy="0"/>
-        </a:xfrm>
-      </p:grpSpPr>
-      <p:sp>
-        <p:nvSpPr>
-          <p:cNvPr name="Freeform 2" id="2"/>
-          <p:cNvSpPr/>
-          <p:nvPr/>
-        </p:nvSpPr>
-        <p:spPr>
-          <a:xfrm flipH="false" flipV="false" rot="-10800000">
-            <a:off x="-3927556" y="5143500"/>
-            <a:ext cx="24228392" cy="8121818"/>
-          </a:xfrm>
-          <a:custGeom>
-            <a:avLst/>
-            <a:gdLst/>
-            <a:ahLst/>
-            <a:cxnLst/>
-            <a:rect r="r" b="b" t="t" l="l"/>
-            <a:pathLst>
-              <a:path h="8121818" w="24228392">
-                <a:moveTo>
-                  <a:pt x="0" y="0"/>
-                </a:moveTo>
-                <a:lnTo>
-                  <a:pt x="24228392" y="0"/>
-                </a:lnTo>
-                <a:lnTo>
-                  <a:pt x="24228392" y="8121818"/>
-                </a:lnTo>
-                <a:lnTo>
-                  <a:pt x="0" y="8121818"/>
-                </a:lnTo>
-                <a:lnTo>
-                  <a:pt x="0" y="0"/>
-                </a:lnTo>
-                <a:close/>
-              </a:path>
-            </a:pathLst>
-          </a:custGeom>
-          <a:blipFill>
-            <a:blip r:embed="rId2">
-              <a:extLst>
-                <a:ext uri="{96DAC541-7B7A-43D3-8B79-37D633B846F1}">
-                  <asvg:svgBlip xmlns:asvg="http://schemas.microsoft.com/office/drawing/2016/SVG/main" r:embed="rId3"/>
-                </a:ext>
-              </a:extLst>
-            </a:blip>
-            <a:stretch>
-              <a:fillRect l="0" t="-46918" r="0" b="0"/>
-            </a:stretch>
-          </a:blipFill>
-        </p:spPr>
-      </p:sp>
       <p:sp>
         <p:nvSpPr>
           <p:cNvPr name="Freeform 3" id="3"/>
@@ -12317,8 +11337,46 @@
         </p:nvSpPr>
         <p:spPr>
           <a:xfrm rot="0">
+            <a:off x="11171225" y="1527309"/>
+            <a:ext cx="4947920" cy="1104265"/>
+          </a:xfrm>
+          <a:prstGeom prst="rect">
+            <a:avLst/>
+          </a:prstGeom>
+        </p:spPr>
+        <p:txBody>
+          <a:bodyPr anchor="t" rtlCol="false" tIns="0" lIns="0" bIns="0" rIns="0">
+            <a:spAutoFit/>
+          </a:bodyPr>
+          <a:lstStyle/>
+          <a:p>
+            <a:pPr>
+              <a:lnSpc>
+                <a:spcPts val="8959"/>
+              </a:lnSpc>
+            </a:pPr>
+            <a:r>
+              <a:rPr lang="en-US" sz="6399">
+                <a:solidFill>
+                  <a:srgbClr val="509FCB"/>
+                </a:solidFill>
+                <a:latin typeface="Roboto Condensed Bold"/>
+              </a:rPr>
+              <a:t>Hunting</a:t>
+            </a:r>
+          </a:p>
+        </p:txBody>
+      </p:sp>
+      <p:sp>
+        <p:nvSpPr>
+          <p:cNvPr name="TextBox 9" id="9"/>
+          <p:cNvSpPr txBox="true"/>
+          <p:nvPr/>
+        </p:nvSpPr>
+        <p:spPr>
+          <a:xfrm rot="0">
             <a:off x="8795563" y="1527309"/>
-            <a:ext cx="5381356" cy="1104265"/>
+            <a:ext cx="2277365" cy="1104265"/>
           </a:xfrm>
           <a:prstGeom prst="rect">
             <a:avLst/>
@@ -12342,21 +11400,21 @@
                 </a:solidFill>
                 <a:latin typeface="Roboto Condensed Bold"/>
               </a:rPr>
-              <a:t>Vulnerabilities</a:t>
+              <a:t>Threat</a:t>
             </a:r>
           </a:p>
         </p:txBody>
       </p:sp>
       <p:sp>
         <p:nvSpPr>
-          <p:cNvPr name="TextBox 9" id="9"/>
+          <p:cNvPr name="TextBox 10" id="10"/>
           <p:cNvSpPr txBox="true"/>
           <p:nvPr/>
         </p:nvSpPr>
         <p:spPr>
           <a:xfrm rot="0">
-            <a:off x="8795563" y="2801138"/>
-            <a:ext cx="8277849" cy="679450"/>
+            <a:off x="8795563" y="3841440"/>
+            <a:ext cx="9205875" cy="2667000"/>
           </a:xfrm>
           <a:prstGeom prst="rect">
             <a:avLst/>
@@ -12370,47 +11428,18 @@
           <a:p>
             <a:pPr>
               <a:lnSpc>
-                <a:spcPts val="5599"/>
-              </a:lnSpc>
-            </a:pPr>
-            <a:r>
-              <a:rPr lang="en-US" sz="3999">
-                <a:solidFill>
-                  <a:srgbClr val="B6E4FD"/>
-                </a:solidFill>
-                <a:latin typeface="Roboto Condensed"/>
-              </a:rPr>
-              <a:t>CLOUD VULNERABILITIES</a:t>
-            </a:r>
-          </a:p>
-        </p:txBody>
-      </p:sp>
-      <p:sp>
-        <p:nvSpPr>
-          <p:cNvPr name="TextBox 10" id="10"/>
-          <p:cNvSpPr txBox="true"/>
-          <p:nvPr/>
-        </p:nvSpPr>
-        <p:spPr>
-          <a:xfrm rot="0">
-            <a:off x="8795563" y="3841440"/>
-            <a:ext cx="9205875" cy="2133600"/>
-          </a:xfrm>
-          <a:prstGeom prst="rect">
-            <a:avLst/>
-          </a:prstGeom>
-        </p:spPr>
-        <p:txBody>
-          <a:bodyPr anchor="t" rtlCol="false" tIns="0" lIns="0" bIns="0" rIns="0">
-            <a:spAutoFit/>
-          </a:bodyPr>
-          <a:lstStyle/>
-          <a:p>
-            <a:pPr>
-              <a:lnSpc>
                 <a:spcPts val="4200"/>
               </a:lnSpc>
             </a:pPr>
+            <a:r>
+              <a:rPr lang="en-US" sz="3000">
+                <a:solidFill>
+                  <a:srgbClr val="FFFFFF"/>
+                </a:solidFill>
+                <a:latin typeface="Roboto Condensed Italics"/>
+              </a:rPr>
+              <a:t>Threat intelligence </a:t>
+            </a:r>
             <a:r>
               <a:rPr lang="en-US" sz="3000">
                 <a:solidFill>
@@ -12418,7 +11447,7 @@
                 </a:solidFill>
                 <a:latin typeface="Roboto Condensed"/>
               </a:rPr>
-              <a:t>With the </a:t>
+              <a:t>is the knowledge behind a threat’s capabilities, infrastructure, motives, goals, and resources. </a:t>
             </a:r>
             <a:r>
               <a:rPr lang="en-US" sz="3000">
@@ -12427,7 +11456,7 @@
                 </a:solidFill>
                 <a:latin typeface="Roboto Condensed Italics"/>
               </a:rPr>
-              <a:t>cloud vulnerabilities</a:t>
+              <a:t>Threat intelligence fusion </a:t>
             </a:r>
             <a:r>
               <a:rPr lang="en-US" sz="3000">
@@ -12436,7 +11465,7 @@
                 </a:solidFill>
                 <a:latin typeface="Roboto Condensed"/>
               </a:rPr>
-              <a:t>, the economies of scale and standardized environments give cloud providers an advantage in the scope and resource side of the equation. </a:t>
+              <a:t>enables a defender to identify and contextualize the threats they face in the environment</a:t>
             </a:r>
           </a:p>
           <a:p>
@@ -12789,8 +11818,46 @@
         </p:nvSpPr>
         <p:spPr>
           <a:xfrm rot="0">
+            <a:off x="11171225" y="1527309"/>
+            <a:ext cx="4947920" cy="1104265"/>
+          </a:xfrm>
+          <a:prstGeom prst="rect">
+            <a:avLst/>
+          </a:prstGeom>
+        </p:spPr>
+        <p:txBody>
+          <a:bodyPr anchor="t" rtlCol="false" tIns="0" lIns="0" bIns="0" rIns="0">
+            <a:spAutoFit/>
+          </a:bodyPr>
+          <a:lstStyle/>
+          <a:p>
+            <a:pPr>
+              <a:lnSpc>
+                <a:spcPts val="8959"/>
+              </a:lnSpc>
+            </a:pPr>
+            <a:r>
+              <a:rPr lang="en-US" sz="6399">
+                <a:solidFill>
+                  <a:srgbClr val="509FCB"/>
+                </a:solidFill>
+                <a:latin typeface="Roboto Condensed Bold"/>
+              </a:rPr>
+              <a:t>Hunting</a:t>
+            </a:r>
+          </a:p>
+        </p:txBody>
+      </p:sp>
+      <p:sp>
+        <p:nvSpPr>
+          <p:cNvPr name="TextBox 9" id="9"/>
+          <p:cNvSpPr txBox="true"/>
+          <p:nvPr/>
+        </p:nvSpPr>
+        <p:spPr>
+          <a:xfrm rot="0">
             <a:off x="8795563" y="1527309"/>
-            <a:ext cx="5381356" cy="1104265"/>
+            <a:ext cx="2277365" cy="1104265"/>
           </a:xfrm>
           <a:prstGeom prst="rect">
             <a:avLst/>
@@ -12814,21 +11881,21 @@
                 </a:solidFill>
                 <a:latin typeface="Roboto Condensed Bold"/>
               </a:rPr>
-              <a:t>Vulnerabilities</a:t>
+              <a:t>Threat</a:t>
             </a:r>
           </a:p>
         </p:txBody>
       </p:sp>
       <p:sp>
         <p:nvSpPr>
-          <p:cNvPr name="TextBox 9" id="9"/>
+          <p:cNvPr name="TextBox 10" id="10"/>
           <p:cNvSpPr txBox="true"/>
           <p:nvPr/>
         </p:nvSpPr>
         <p:spPr>
           <a:xfrm rot="0">
-            <a:off x="8795563" y="2801138"/>
-            <a:ext cx="8277849" cy="679450"/>
+            <a:off x="8795563" y="3841440"/>
+            <a:ext cx="9205875" cy="3733800"/>
           </a:xfrm>
           <a:prstGeom prst="rect">
             <a:avLst/>
@@ -12842,47 +11909,18 @@
           <a:p>
             <a:pPr>
               <a:lnSpc>
-                <a:spcPts val="5599"/>
-              </a:lnSpc>
-            </a:pPr>
-            <a:r>
-              <a:rPr lang="en-US" sz="3999">
-                <a:solidFill>
-                  <a:srgbClr val="B6E4FD"/>
-                </a:solidFill>
-                <a:latin typeface="Roboto Condensed"/>
-              </a:rPr>
-              <a:t>ZERO DAY VULNERABILITIES</a:t>
-            </a:r>
-          </a:p>
-        </p:txBody>
-      </p:sp>
-      <p:sp>
-        <p:nvSpPr>
-          <p:cNvPr name="TextBox 10" id="10"/>
-          <p:cNvSpPr txBox="true"/>
-          <p:nvPr/>
-        </p:nvSpPr>
-        <p:spPr>
-          <a:xfrm rot="0">
-            <a:off x="8795563" y="3841440"/>
-            <a:ext cx="9205875" cy="2667000"/>
-          </a:xfrm>
-          <a:prstGeom prst="rect">
-            <a:avLst/>
-          </a:prstGeom>
-        </p:spPr>
-        <p:txBody>
-          <a:bodyPr anchor="t" rtlCol="false" tIns="0" lIns="0" bIns="0" rIns="0">
-            <a:spAutoFit/>
-          </a:bodyPr>
-          <a:lstStyle/>
-          <a:p>
-            <a:pPr>
-              <a:lnSpc>
                 <a:spcPts val="4200"/>
               </a:lnSpc>
             </a:pPr>
+            <a:r>
+              <a:rPr lang="en-US" sz="3000">
+                <a:solidFill>
+                  <a:srgbClr val="FFFFFF"/>
+                </a:solidFill>
+                <a:latin typeface="Roboto Condensed Italics"/>
+              </a:rPr>
+              <a:t>Threat feeds </a:t>
+            </a:r>
             <a:r>
               <a:rPr lang="en-US" sz="3000">
                 <a:solidFill>
@@ -12890,7 +11928,7 @@
                 </a:solidFill>
                 <a:latin typeface="Roboto Condensed"/>
               </a:rPr>
-              <a:t>Zero day is a term used to define vulnerabilities that are newly discovered and not yet addressed by a patch. Most vulnerabilities exist in an unknown state until discovered by a researcher or developer. </a:t>
+              <a:t>are sources of information concerning adversaries. Threat feeds can come from internal and external sources. By leveraging threat data from your own network based on incident response data (that is, log files, alerts, and incident response findings), it is possible to find other locations of the same threat in your environment.</a:t>
             </a:r>
           </a:p>
           <a:p>
@@ -13243,7 +12281,7 @@
         </p:nvSpPr>
         <p:spPr>
           <a:xfrm rot="0">
-            <a:off x="10780405" y="1527309"/>
+            <a:off x="11171225" y="1527309"/>
             <a:ext cx="4947920" cy="1104265"/>
           </a:xfrm>
           <a:prstGeom prst="rect">
@@ -13268,7 +12306,7 @@
                 </a:solidFill>
                 <a:latin typeface="Roboto Condensed Bold"/>
               </a:rPr>
-              <a:t>Configurations</a:t>
+              <a:t>Hunting</a:t>
             </a:r>
           </a:p>
         </p:txBody>
@@ -13306,7 +12344,7 @@
                 </a:solidFill>
                 <a:latin typeface="Roboto Condensed Bold"/>
               </a:rPr>
-              <a:t>Weak</a:t>
+              <a:t>Threat</a:t>
             </a:r>
           </a:p>
         </p:txBody>
@@ -13319,8 +12357,8 @@
         </p:nvSpPr>
         <p:spPr>
           <a:xfrm rot="0">
-            <a:off x="8795563" y="2801138"/>
-            <a:ext cx="4751325" cy="679450"/>
+            <a:off x="8795563" y="3841440"/>
+            <a:ext cx="9205875" cy="2667000"/>
           </a:xfrm>
           <a:prstGeom prst="rect">
             <a:avLst/>
@@ -13334,47 +12372,18 @@
           <a:p>
             <a:pPr>
               <a:lnSpc>
-                <a:spcPts val="5599"/>
-              </a:lnSpc>
-            </a:pPr>
-            <a:r>
-              <a:rPr lang="en-US" sz="3999">
-                <a:solidFill>
-                  <a:srgbClr val="B6E4FD"/>
-                </a:solidFill>
-                <a:latin typeface="Roboto Condensed"/>
-              </a:rPr>
-              <a:t>OPEN PERMISSIONS</a:t>
-            </a:r>
-          </a:p>
-        </p:txBody>
-      </p:sp>
-      <p:sp>
-        <p:nvSpPr>
-          <p:cNvPr name="TextBox 11" id="11"/>
-          <p:cNvSpPr txBox="true"/>
-          <p:nvPr/>
-        </p:nvSpPr>
-        <p:spPr>
-          <a:xfrm rot="0">
-            <a:off x="8795563" y="3841440"/>
-            <a:ext cx="9205875" cy="4800600"/>
-          </a:xfrm>
-          <a:prstGeom prst="rect">
-            <a:avLst/>
-          </a:prstGeom>
-        </p:spPr>
-        <p:txBody>
-          <a:bodyPr anchor="t" rtlCol="false" tIns="0" lIns="0" bIns="0" rIns="0">
-            <a:spAutoFit/>
-          </a:bodyPr>
-          <a:lstStyle/>
-          <a:p>
-            <a:pPr>
-              <a:lnSpc>
                 <a:spcPts val="4200"/>
               </a:lnSpc>
             </a:pPr>
+            <a:r>
+              <a:rPr lang="en-US" sz="3000">
+                <a:solidFill>
+                  <a:srgbClr val="FFFFFF"/>
+                </a:solidFill>
+                <a:latin typeface="Roboto Condensed Italics"/>
+              </a:rPr>
+              <a:t>Advisories and bulletins </a:t>
+            </a:r>
             <a:r>
               <a:rPr lang="en-US" sz="3000">
                 <a:solidFill>
@@ -13382,25 +12391,7 @@
                 </a:solidFill>
                 <a:latin typeface="Roboto Condensed"/>
               </a:rPr>
-              <a:t>Permissions is the term used to describe the range of activities permitted on an object by an actor in a system. Having properly configured permissions is one of the defenses that can be employed in the enterprise. Managing permissions can be tedious, and as the size of the enterprise grows, the scale of permissions requires automation to manage. When permissions are not properly set, the condition of </a:t>
-            </a:r>
-            <a:r>
-              <a:rPr lang="en-US" sz="3000">
-                <a:solidFill>
-                  <a:srgbClr val="FFFFFF"/>
-                </a:solidFill>
-                <a:latin typeface="Roboto Condensed Italics"/>
-              </a:rPr>
-              <a:t>open permissions</a:t>
-            </a:r>
-            <a:r>
-              <a:rPr lang="en-US" sz="3000">
-                <a:solidFill>
-                  <a:srgbClr val="FFFFFF"/>
-                </a:solidFill>
-                <a:latin typeface="Roboto Condensed"/>
-              </a:rPr>
-              <a:t> exists.</a:t>
+              <a:t>are published sets of information from partners, such as security vendors, industry groups, the government, information-sharing groups, and other sources of “trusted” information.</a:t>
             </a:r>
           </a:p>
           <a:p>
@@ -13753,7 +12744,7 @@
         </p:nvSpPr>
         <p:spPr>
           <a:xfrm rot="0">
-            <a:off x="10780405" y="1527309"/>
+            <a:off x="11171225" y="1527309"/>
             <a:ext cx="4947920" cy="1104265"/>
           </a:xfrm>
           <a:prstGeom prst="rect">
@@ -13778,7 +12769,7 @@
                 </a:solidFill>
                 <a:latin typeface="Roboto Condensed Bold"/>
               </a:rPr>
-              <a:t>Configurations</a:t>
+              <a:t>Hunting</a:t>
             </a:r>
           </a:p>
         </p:txBody>
@@ -13816,7 +12807,7 @@
                 </a:solidFill>
                 <a:latin typeface="Roboto Condensed Bold"/>
               </a:rPr>
-              <a:t>Weak</a:t>
+              <a:t>Threat</a:t>
             </a:r>
           </a:p>
         </p:txBody>
@@ -13829,46 +12820,8 @@
         </p:nvSpPr>
         <p:spPr>
           <a:xfrm rot="0">
-            <a:off x="8795563" y="2801138"/>
-            <a:ext cx="8099085" cy="679450"/>
-          </a:xfrm>
-          <a:prstGeom prst="rect">
-            <a:avLst/>
-          </a:prstGeom>
-        </p:spPr>
-        <p:txBody>
-          <a:bodyPr anchor="t" rtlCol="false" tIns="0" lIns="0" bIns="0" rIns="0">
-            <a:spAutoFit/>
-          </a:bodyPr>
-          <a:lstStyle/>
-          <a:p>
-            <a:pPr>
-              <a:lnSpc>
-                <a:spcPts val="5599"/>
-              </a:lnSpc>
-            </a:pPr>
-            <a:r>
-              <a:rPr lang="en-US" sz="3999">
-                <a:solidFill>
-                  <a:srgbClr val="B6E4FD"/>
-                </a:solidFill>
-                <a:latin typeface="Roboto Condensed"/>
-              </a:rPr>
-              <a:t>UNSECURE ROOT ACCOUNTS </a:t>
-            </a:r>
-          </a:p>
-        </p:txBody>
-      </p:sp>
-      <p:sp>
-        <p:nvSpPr>
-          <p:cNvPr name="TextBox 11" id="11"/>
-          <p:cNvSpPr txBox="true"/>
-          <p:nvPr/>
-        </p:nvSpPr>
-        <p:spPr>
-          <a:xfrm rot="0">
             <a:off x="8795563" y="3841440"/>
-            <a:ext cx="9205875" cy="3200400"/>
+            <a:ext cx="9205875" cy="2667000"/>
           </a:xfrm>
           <a:prstGeom prst="rect">
             <a:avLst/>
@@ -13892,7 +12845,7 @@
                 </a:solidFill>
                 <a:latin typeface="Roboto Condensed Italics"/>
               </a:rPr>
-              <a:t>Unsecure root accounts </a:t>
+              <a:t>Maneuver</a:t>
             </a:r>
             <a:r>
               <a:rPr lang="en-US" sz="3000">
@@ -13901,7 +12854,7 @@
                 </a:solidFill>
                 <a:latin typeface="Roboto Condensed"/>
               </a:rPr>
-              <a:t>are like leaving master keys to the enterprise outside on the curb. Root accounts have access to everything and the ability to do virtually any activity on a network. All root accounts should be monitored, and all accesses should be verified as correct.</a:t>
+              <a:t> refers to the ability to move within a network, a tactic commonly used by advanced adversaries as they move toward their objectives. Threat hunting can counter an attacker maneuvering via a couple mechanisms. </a:t>
             </a:r>
           </a:p>
           <a:p>
@@ -14254,7 +13207,7 @@
         </p:nvSpPr>
         <p:spPr>
           <a:xfrm rot="0">
-            <a:off x="10780405" y="1527309"/>
+            <a:off x="13186381" y="1527309"/>
             <a:ext cx="4947920" cy="1104265"/>
           </a:xfrm>
           <a:prstGeom prst="rect">
@@ -14279,7 +13232,7 @@
                 </a:solidFill>
                 <a:latin typeface="Roboto Condensed Bold"/>
               </a:rPr>
-              <a:t>Configurations</a:t>
+              <a:t>Scans</a:t>
             </a:r>
           </a:p>
         </p:txBody>
@@ -14293,7 +13246,7 @@
         <p:spPr>
           <a:xfrm rot="0">
             <a:off x="8795563" y="1527309"/>
-            <a:ext cx="2277365" cy="1104265"/>
+            <a:ext cx="5072582" cy="1104265"/>
           </a:xfrm>
           <a:prstGeom prst="rect">
             <a:avLst/>
@@ -14317,7 +13270,7 @@
                 </a:solidFill>
                 <a:latin typeface="Roboto Condensed Bold"/>
               </a:rPr>
-              <a:t>Weak</a:t>
+              <a:t>Vulnerability </a:t>
             </a:r>
           </a:p>
         </p:txBody>
@@ -14330,46 +13283,8 @@
         </p:nvSpPr>
         <p:spPr>
           <a:xfrm rot="0">
-            <a:off x="8795563" y="2801138"/>
-            <a:ext cx="8099085" cy="679450"/>
-          </a:xfrm>
-          <a:prstGeom prst="rect">
-            <a:avLst/>
-          </a:prstGeom>
-        </p:spPr>
-        <p:txBody>
-          <a:bodyPr anchor="t" rtlCol="false" tIns="0" lIns="0" bIns="0" rIns="0">
-            <a:spAutoFit/>
-          </a:bodyPr>
-          <a:lstStyle/>
-          <a:p>
-            <a:pPr>
-              <a:lnSpc>
-                <a:spcPts val="5599"/>
-              </a:lnSpc>
-            </a:pPr>
-            <a:r>
-              <a:rPr lang="en-US" sz="3999">
-                <a:solidFill>
-                  <a:srgbClr val="B6E4FD"/>
-                </a:solidFill>
-                <a:latin typeface="Roboto Condensed"/>
-              </a:rPr>
-              <a:t>DEFAULT SETTINGS</a:t>
-            </a:r>
-          </a:p>
-        </p:txBody>
-      </p:sp>
-      <p:sp>
-        <p:nvSpPr>
-          <p:cNvPr name="TextBox 11" id="11"/>
-          <p:cNvSpPr txBox="true"/>
-          <p:nvPr/>
-        </p:nvSpPr>
-        <p:spPr>
-          <a:xfrm rot="0">
             <a:off x="8795563" y="3841440"/>
-            <a:ext cx="9205875" cy="3733800"/>
+            <a:ext cx="9205875" cy="3200400"/>
           </a:xfrm>
           <a:prstGeom prst="rect">
             <a:avLst/>
@@ -14393,7 +13308,7 @@
                 </a:solidFill>
                 <a:latin typeface="Roboto Condensed Italics"/>
               </a:rPr>
-              <a:t>Default settings </a:t>
+              <a:t>Vulnerability scanning </a:t>
             </a:r>
             <a:r>
               <a:rPr lang="en-US" sz="3000">
@@ -14402,7 +13317,7 @@
                 </a:solidFill>
                 <a:latin typeface="Roboto Condensed"/>
               </a:rPr>
-              <a:t>can be a security risk unless they were created with security in mind. Older operating systems used to have everything enabled by default. Old versions of some systems had hidden administrator accounts, and Microsoft’s SQL Server used to have a blank system administrator password by default.</a:t>
+              <a:t>is the process of examining services on computer systems for known vulnerabilities in software. This is basically a simple process of determining the specific version of a software program and then looking up the known vulnerabilities.</a:t>
             </a:r>
           </a:p>
           <a:p>
@@ -14755,7 +13670,7 @@
         </p:nvSpPr>
         <p:spPr>
           <a:xfrm rot="0">
-            <a:off x="10780405" y="1527309"/>
+            <a:off x="13186381" y="1527309"/>
             <a:ext cx="4947920" cy="1104265"/>
           </a:xfrm>
           <a:prstGeom prst="rect">
@@ -14780,7 +13695,7 @@
                 </a:solidFill>
                 <a:latin typeface="Roboto Condensed Bold"/>
               </a:rPr>
-              <a:t>Configurations</a:t>
+              <a:t>Scans</a:t>
             </a:r>
           </a:p>
         </p:txBody>
@@ -14794,7 +13709,7 @@
         <p:spPr>
           <a:xfrm rot="0">
             <a:off x="8795563" y="1527309"/>
-            <a:ext cx="2277365" cy="1104265"/>
+            <a:ext cx="5072582" cy="1104265"/>
           </a:xfrm>
           <a:prstGeom prst="rect">
             <a:avLst/>
@@ -14818,7 +13733,7 @@
                 </a:solidFill>
                 <a:latin typeface="Roboto Condensed Bold"/>
               </a:rPr>
-              <a:t>Weak</a:t>
+              <a:t>Vulnerability </a:t>
             </a:r>
           </a:p>
         </p:txBody>
@@ -14831,8 +13746,8 @@
         </p:nvSpPr>
         <p:spPr>
           <a:xfrm rot="0">
-            <a:off x="8795563" y="2801138"/>
-            <a:ext cx="8099085" cy="679450"/>
+            <a:off x="8795563" y="3841440"/>
+            <a:ext cx="9205875" cy="3733800"/>
           </a:xfrm>
           <a:prstGeom prst="rect">
             <a:avLst/>
@@ -14846,41 +13761,10 @@
           <a:p>
             <a:pPr>
               <a:lnSpc>
-                <a:spcPts val="5599"/>
+                <a:spcPts val="4200"/>
               </a:lnSpc>
             </a:pPr>
-            <a:r>
-              <a:rPr lang="en-US" sz="3999">
-                <a:solidFill>
-                  <a:srgbClr val="B6E4FD"/>
-                </a:solidFill>
-                <a:latin typeface="Roboto Condensed"/>
-              </a:rPr>
-              <a:t>OPEN PORTS</a:t>
-            </a:r>
-          </a:p>
-        </p:txBody>
-      </p:sp>
-      <p:sp>
-        <p:nvSpPr>
-          <p:cNvPr name="TextBox 11" id="11"/>
-          <p:cNvSpPr txBox="true"/>
-          <p:nvPr/>
-        </p:nvSpPr>
-        <p:spPr>
-          <a:xfrm rot="0">
-            <a:off x="8795563" y="3841440"/>
-            <a:ext cx="9205875" cy="3200400"/>
-          </a:xfrm>
-          <a:prstGeom prst="rect">
-            <a:avLst/>
-          </a:prstGeom>
-        </p:spPr>
-        <p:txBody>
-          <a:bodyPr anchor="t" rtlCol="false" tIns="0" lIns="0" bIns="0" rIns="0">
-            <a:spAutoFit/>
-          </a:bodyPr>
-          <a:lstStyle/>
+          </a:p>
           <a:p>
             <a:pPr>
               <a:lnSpc>
@@ -14894,7 +13778,7 @@
                 </a:solidFill>
                 <a:latin typeface="Roboto Condensed"/>
               </a:rPr>
-              <a:t>For a service to respond to a request, its port must be open for communication. Having </a:t>
+              <a:t>If you test for something, get a positive indication, but the indication is wrong, that is a </a:t>
             </a:r>
             <a:r>
               <a:rPr lang="en-US" sz="3000">
@@ -14903,7 +13787,7 @@
                 </a:solidFill>
                 <a:latin typeface="Roboto Condensed Italics"/>
               </a:rPr>
-              <a:t>open ports </a:t>
+              <a:t>false positive</a:t>
             </a:r>
             <a:r>
               <a:rPr lang="en-US" sz="3000">
@@ -14912,7 +13796,30 @@
                 </a:solidFill>
                 <a:latin typeface="Roboto Condensed"/>
               </a:rPr>
-              <a:t>is like having doors in a building. Even a bank vault has a door. Having excess </a:t>
+              <a:t>. </a:t>
+            </a:r>
+          </a:p>
+          <a:p>
+            <a:pPr>
+              <a:lnSpc>
+                <a:spcPts val="4200"/>
+              </a:lnSpc>
+            </a:pPr>
+          </a:p>
+          <a:p>
+            <a:pPr>
+              <a:lnSpc>
+                <a:spcPts val="4200"/>
+              </a:lnSpc>
+            </a:pPr>
+            <a:r>
+              <a:rPr lang="en-US" sz="3000">
+                <a:solidFill>
+                  <a:srgbClr val="FFFFFF"/>
+                </a:solidFill>
+                <a:latin typeface="Roboto Condensed"/>
+              </a:rPr>
+              <a:t>If you test for something, do not get an indication, but the results should have been true, this is a </a:t>
             </a:r>
             <a:r>
               <a:rPr lang="en-US" sz="3000">
@@ -14921,7 +13828,7 @@
                 </a:solidFill>
                 <a:latin typeface="Roboto Condensed Italics"/>
               </a:rPr>
-              <a:t>open services </a:t>
+              <a:t>false negative</a:t>
             </a:r>
             <a:r>
               <a:rPr lang="en-US" sz="3000">
@@ -14930,7 +13837,7 @@
                 </a:solidFill>
                 <a:latin typeface="Roboto Condensed"/>
               </a:rPr>
-              <a:t>only leads to pathways into your systems that must be protected. </a:t>
+              <a:t>. </a:t>
             </a:r>
           </a:p>
           <a:p>
@@ -15283,7 +14190,7 @@
         </p:nvSpPr>
         <p:spPr>
           <a:xfrm rot="0">
-            <a:off x="10780405" y="1527309"/>
+            <a:off x="13186381" y="1527309"/>
             <a:ext cx="4947920" cy="1104265"/>
           </a:xfrm>
           <a:prstGeom prst="rect">
@@ -15308,7 +14215,7 @@
                 </a:solidFill>
                 <a:latin typeface="Roboto Condensed Bold"/>
               </a:rPr>
-              <a:t>Party Risks</a:t>
+              <a:t>Scans</a:t>
             </a:r>
           </a:p>
         </p:txBody>
@@ -15322,7 +14229,7 @@
         <p:spPr>
           <a:xfrm rot="0">
             <a:off x="8795563" y="1527309"/>
-            <a:ext cx="2277365" cy="1104265"/>
+            <a:ext cx="5072582" cy="1104265"/>
           </a:xfrm>
           <a:prstGeom prst="rect">
             <a:avLst/>
@@ -15346,7 +14253,7 @@
                 </a:solidFill>
                 <a:latin typeface="Roboto Condensed Bold"/>
               </a:rPr>
-              <a:t>Third</a:t>
+              <a:t>Vulnerability </a:t>
             </a:r>
           </a:p>
         </p:txBody>
@@ -15359,8 +14266,8 @@
         </p:nvSpPr>
         <p:spPr>
           <a:xfrm rot="0">
-            <a:off x="8795563" y="2801138"/>
-            <a:ext cx="8099085" cy="679450"/>
+            <a:off x="8795563" y="3841440"/>
+            <a:ext cx="9205875" cy="3200400"/>
           </a:xfrm>
           <a:prstGeom prst="rect">
             <a:avLst/>
@@ -15374,41 +14281,10 @@
           <a:p>
             <a:pPr>
               <a:lnSpc>
-                <a:spcPts val="5599"/>
+                <a:spcPts val="4200"/>
               </a:lnSpc>
             </a:pPr>
-            <a:r>
-              <a:rPr lang="en-US" sz="3999">
-                <a:solidFill>
-                  <a:srgbClr val="B6E4FD"/>
-                </a:solidFill>
-                <a:latin typeface="Roboto Condensed"/>
-              </a:rPr>
-              <a:t>VENDOR MANAGEMENT </a:t>
-            </a:r>
-          </a:p>
-        </p:txBody>
-      </p:sp>
-      <p:sp>
-        <p:nvSpPr>
-          <p:cNvPr name="TextBox 11" id="11"/>
-          <p:cNvSpPr txBox="true"/>
-          <p:nvPr/>
-        </p:nvSpPr>
-        <p:spPr>
-          <a:xfrm rot="0">
-            <a:off x="8795563" y="3841440"/>
-            <a:ext cx="9205875" cy="4267200"/>
-          </a:xfrm>
-          <a:prstGeom prst="rect">
-            <a:avLst/>
-          </a:prstGeom>
-        </p:spPr>
-        <p:txBody>
-          <a:bodyPr anchor="t" rtlCol="false" tIns="0" lIns="0" bIns="0" rIns="0">
-            <a:spAutoFit/>
-          </a:bodyPr>
-          <a:lstStyle/>
+          </a:p>
           <a:p>
             <a:pPr>
               <a:lnSpc>
@@ -15422,7 +14298,7 @@
                 </a:solidFill>
                 <a:latin typeface="Roboto Condensed"/>
               </a:rPr>
-              <a:t>The challenge of </a:t>
+              <a:t>A </a:t>
             </a:r>
             <a:r>
               <a:rPr lang="en-US" sz="3000">
@@ -15431,7 +14307,7 @@
                 </a:solidFill>
                 <a:latin typeface="Roboto Condensed Italics"/>
               </a:rPr>
-              <a:t>vendor management </a:t>
+              <a:t>non-intrusive scan </a:t>
             </a:r>
             <a:r>
               <a:rPr lang="en-US" sz="3000">
@@ -15440,7 +14316,25 @@
                 </a:solidFill>
                 <a:latin typeface="Roboto Condensed"/>
               </a:rPr>
-              <a:t>is one of determining one’s own needs and then finding the vendors that offer the best value proposition against those needs. This is more than just selecting and buying a product for most components in an enterprise; issues of support, system lifetime, and maintenance all play a role in the long-term value of a vendor and their products</a:t>
+              <a:t>is typically a simple scan of open ports and services, where an </a:t>
+            </a:r>
+            <a:r>
+              <a:rPr lang="en-US" sz="3000">
+                <a:solidFill>
+                  <a:srgbClr val="FFFFFF"/>
+                </a:solidFill>
+                <a:latin typeface="Roboto Condensed Italics"/>
+              </a:rPr>
+              <a:t>intrusive scan </a:t>
+            </a:r>
+            <a:r>
+              <a:rPr lang="en-US" sz="3000">
+                <a:solidFill>
+                  <a:srgbClr val="FFFFFF"/>
+                </a:solidFill>
+                <a:latin typeface="Roboto Condensed"/>
+              </a:rPr>
+              <a:t>attempts to leverage potential vulnerabilities through an exploit to demonstrate the vulnerabilities.</a:t>
             </a:r>
           </a:p>
           <a:p>

</xml_diff>